<commit_message>
Added Constants file storing Kafka Server IP
</commit_message>
<xml_diff>
--- a/BlockChain/BlockChain.pptx
+++ b/BlockChain/BlockChain.pptx
@@ -2537,10 +2537,9 @@
         <a:lstStyle/>
         <a:p>
           <a:r>
-            <a:rPr lang="en-US" dirty="0" smtClean="0"/>
+            <a:rPr lang="en-US" dirty="0"/>
             <a:t>Master-Slave</a:t>
           </a:r>
-          <a:endParaRPr lang="en-US" dirty="0"/>
         </a:p>
       </dgm:t>
     </dgm:pt>
@@ -2574,10 +2573,9 @@
         <a:lstStyle/>
         <a:p>
           <a:r>
-            <a:rPr lang="en-US" dirty="0" smtClean="0"/>
+            <a:rPr lang="en-US" dirty="0"/>
             <a:t>Single point of failure</a:t>
           </a:r>
-          <a:endParaRPr lang="en-US" dirty="0"/>
         </a:p>
       </dgm:t>
     </dgm:pt>
@@ -2611,10 +2609,9 @@
         <a:lstStyle/>
         <a:p>
           <a:r>
-            <a:rPr lang="en-US" dirty="0" smtClean="0"/>
+            <a:rPr lang="en-US" dirty="0"/>
             <a:t>Single copy of data</a:t>
           </a:r>
-          <a:endParaRPr lang="en-US" dirty="0"/>
         </a:p>
       </dgm:t>
     </dgm:pt>
@@ -2648,10 +2645,9 @@
         <a:lstStyle/>
         <a:p>
           <a:r>
-            <a:rPr lang="en-US" dirty="0" smtClean="0"/>
+            <a:rPr lang="en-US" dirty="0"/>
             <a:t>Peer to Peer</a:t>
           </a:r>
-          <a:endParaRPr lang="en-US" dirty="0"/>
         </a:p>
       </dgm:t>
     </dgm:pt>
@@ -2685,10 +2681,9 @@
         <a:lstStyle/>
         <a:p>
           <a:r>
-            <a:rPr lang="en-US" dirty="0" smtClean="0"/>
+            <a:rPr lang="en-US" dirty="0"/>
             <a:t>Updates propagate to replicas</a:t>
           </a:r>
-          <a:endParaRPr lang="en-US" dirty="0"/>
         </a:p>
       </dgm:t>
     </dgm:pt>
@@ -2722,10 +2717,9 @@
         <a:lstStyle/>
         <a:p>
           <a:r>
-            <a:rPr lang="en-US" dirty="0" smtClean="0"/>
+            <a:rPr lang="en-US" dirty="0"/>
             <a:t>Masterless: all copies equal</a:t>
           </a:r>
-          <a:endParaRPr lang="en-US" dirty="0"/>
         </a:p>
       </dgm:t>
     </dgm:pt>
@@ -2760,13 +2754,6 @@
         </dgm:presLayoutVars>
       </dgm:prSet>
       <dgm:spPr/>
-      <dgm:t>
-        <a:bodyPr/>
-        <a:lstStyle/>
-        <a:p>
-          <a:endParaRPr lang="en-US"/>
-        </a:p>
-      </dgm:t>
     </dgm:pt>
     <dgm:pt modelId="{78A126F9-7B1D-4DBC-BDF3-670D76C87A9D}" type="pres">
       <dgm:prSet presAssocID="{92D92F85-F047-441B-9CDA-F16FD67D88B0}" presName="dummyMaxCanvas" presStyleCnt="0"/>
@@ -2783,13 +2770,6 @@
         </dgm:presLayoutVars>
       </dgm:prSet>
       <dgm:spPr/>
-      <dgm:t>
-        <a:bodyPr/>
-        <a:lstStyle/>
-        <a:p>
-          <a:endParaRPr lang="en-US"/>
-        </a:p>
-      </dgm:t>
     </dgm:pt>
     <dgm:pt modelId="{1D8DC2D3-FB5A-4C3F-B797-2F1FD6918D5D}" type="pres">
       <dgm:prSet presAssocID="{92D92F85-F047-441B-9CDA-F16FD67D88B0}" presName="parent2" presStyleLbl="alignAccFollowNode1" presStyleIdx="1" presStyleCnt="4">
@@ -2798,13 +2778,6 @@
         </dgm:presLayoutVars>
       </dgm:prSet>
       <dgm:spPr/>
-      <dgm:t>
-        <a:bodyPr/>
-        <a:lstStyle/>
-        <a:p>
-          <a:endParaRPr lang="en-US"/>
-        </a:p>
-      </dgm:t>
     </dgm:pt>
     <dgm:pt modelId="{1F6DEFB3-E802-4F17-8EA3-29673EFA86F2}" type="pres">
       <dgm:prSet presAssocID="{92D92F85-F047-441B-9CDA-F16FD67D88B0}" presName="childrenComposite" presStyleCnt="0"/>
@@ -2833,13 +2806,6 @@
         </dgm:presLayoutVars>
       </dgm:prSet>
       <dgm:spPr/>
-      <dgm:t>
-        <a:bodyPr/>
-        <a:lstStyle/>
-        <a:p>
-          <a:endParaRPr lang="en-US"/>
-        </a:p>
-      </dgm:t>
     </dgm:pt>
     <dgm:pt modelId="{20EDB2D3-6B22-4569-A635-95093CCDABAE}" type="pres">
       <dgm:prSet presAssocID="{92D92F85-F047-441B-9CDA-F16FD67D88B0}" presName="right_22_2" presStyleLbl="node1" presStyleIdx="1" presStyleCnt="4">
@@ -2848,13 +2814,6 @@
         </dgm:presLayoutVars>
       </dgm:prSet>
       <dgm:spPr/>
-      <dgm:t>
-        <a:bodyPr/>
-        <a:lstStyle/>
-        <a:p>
-          <a:endParaRPr lang="en-US"/>
-        </a:p>
-      </dgm:t>
     </dgm:pt>
     <dgm:pt modelId="{BD4683D7-6102-4906-AFB6-1E355101CC77}" type="pres">
       <dgm:prSet presAssocID="{92D92F85-F047-441B-9CDA-F16FD67D88B0}" presName="left_22_1" presStyleLbl="node1" presStyleIdx="2" presStyleCnt="4">
@@ -2863,13 +2822,6 @@
         </dgm:presLayoutVars>
       </dgm:prSet>
       <dgm:spPr/>
-      <dgm:t>
-        <a:bodyPr/>
-        <a:lstStyle/>
-        <a:p>
-          <a:endParaRPr lang="en-US"/>
-        </a:p>
-      </dgm:t>
     </dgm:pt>
     <dgm:pt modelId="{483BAA87-0B38-4B35-B979-08A65CF97267}" type="pres">
       <dgm:prSet presAssocID="{92D92F85-F047-441B-9CDA-F16FD67D88B0}" presName="left_22_2" presStyleLbl="node1" presStyleIdx="3" presStyleCnt="4">
@@ -2878,13 +2830,6 @@
         </dgm:presLayoutVars>
       </dgm:prSet>
       <dgm:spPr/>
-      <dgm:t>
-        <a:bodyPr/>
-        <a:lstStyle/>
-        <a:p>
-          <a:endParaRPr lang="en-US"/>
-        </a:p>
-      </dgm:t>
     </dgm:pt>
   </dgm:ptLst>
   <dgm:cxnLst>
@@ -2946,16 +2891,15 @@
         <a:lstStyle/>
         <a:p>
           <a:r>
-            <a:rPr lang="en-US" dirty="0" smtClean="0"/>
+            <a:rPr lang="en-US" dirty="0"/>
             <a:t>Distributed database</a:t>
           </a:r>
         </a:p>
         <a:p>
           <a:r>
-            <a:rPr lang="en-US" dirty="0" smtClean="0"/>
+            <a:rPr lang="en-US" dirty="0"/>
             <a:t>Peer to Peer</a:t>
           </a:r>
-          <a:endParaRPr lang="en-US" dirty="0"/>
         </a:p>
       </dgm:t>
     </dgm:pt>
@@ -2989,10 +2933,9 @@
         <a:lstStyle/>
         <a:p>
           <a:r>
-            <a:rPr lang="en-US" dirty="0" smtClean="0"/>
+            <a:rPr lang="en-US" dirty="0"/>
             <a:t>Transparent &amp; Incorruptible</a:t>
           </a:r>
-          <a:endParaRPr lang="en-US" dirty="0"/>
         </a:p>
       </dgm:t>
     </dgm:pt>
@@ -3026,7 +2969,7 @@
         <a:lstStyle/>
         <a:p>
           <a:r>
-            <a:rPr lang="en-US" dirty="0" smtClean="0"/>
+            <a:rPr lang="en-US" dirty="0"/>
             <a:t>No single point of failure </a:t>
           </a:r>
         </a:p>
@@ -3062,13 +3005,13 @@
         <a:lstStyle/>
         <a:p>
           <a:r>
-            <a:rPr lang="en-US" dirty="0" smtClean="0"/>
+            <a:rPr lang="en-US" dirty="0"/>
             <a:t>Decentralized consensus</a:t>
           </a:r>
         </a:p>
         <a:p>
           <a:r>
-            <a:rPr lang="en-US" smtClean="0"/>
+            <a:rPr lang="en-US"/>
             <a:t>(not controlled by any single identity)</a:t>
           </a:r>
           <a:endParaRPr lang="en-US" dirty="0"/>
@@ -3105,10 +3048,9 @@
         <a:lstStyle/>
         <a:p>
           <a:r>
-            <a:rPr lang="en-US" dirty="0" smtClean="0"/>
+            <a:rPr lang="en-US" dirty="0"/>
             <a:t>Enhanced security</a:t>
           </a:r>
-          <a:endParaRPr lang="en-US" dirty="0"/>
         </a:p>
       </dgm:t>
     </dgm:pt>
@@ -3142,13 +3084,6 @@
         </dgm:presLayoutVars>
       </dgm:prSet>
       <dgm:spPr/>
-      <dgm:t>
-        <a:bodyPr/>
-        <a:lstStyle/>
-        <a:p>
-          <a:endParaRPr lang="en-US"/>
-        </a:p>
-      </dgm:t>
     </dgm:pt>
     <dgm:pt modelId="{60CF439C-49C3-4D7F-8989-D99482B43AC9}" type="pres">
       <dgm:prSet presAssocID="{3B7F73B4-71A6-4F62-89E6-5FE263D310C7}" presName="node" presStyleLbl="node1" presStyleIdx="0" presStyleCnt="5">
@@ -3157,13 +3092,6 @@
         </dgm:presLayoutVars>
       </dgm:prSet>
       <dgm:spPr/>
-      <dgm:t>
-        <a:bodyPr/>
-        <a:lstStyle/>
-        <a:p>
-          <a:endParaRPr lang="en-US"/>
-        </a:p>
-      </dgm:t>
     </dgm:pt>
     <dgm:pt modelId="{31210659-718B-4505-B116-7183E849BE80}" type="pres">
       <dgm:prSet presAssocID="{63CECCF4-4763-4F64-A2FC-D09D5627EA7A}" presName="sibTrans" presStyleCnt="0"/>
@@ -3176,13 +3104,6 @@
         </dgm:presLayoutVars>
       </dgm:prSet>
       <dgm:spPr/>
-      <dgm:t>
-        <a:bodyPr/>
-        <a:lstStyle/>
-        <a:p>
-          <a:endParaRPr lang="en-US"/>
-        </a:p>
-      </dgm:t>
     </dgm:pt>
     <dgm:pt modelId="{C7653508-1A77-47F3-8BF1-533B2D053A1F}" type="pres">
       <dgm:prSet presAssocID="{21742E62-EF4D-4463-83AA-BB3F83B9688D}" presName="sibTrans" presStyleCnt="0"/>
@@ -3195,13 +3116,6 @@
         </dgm:presLayoutVars>
       </dgm:prSet>
       <dgm:spPr/>
-      <dgm:t>
-        <a:bodyPr/>
-        <a:lstStyle/>
-        <a:p>
-          <a:endParaRPr lang="en-US"/>
-        </a:p>
-      </dgm:t>
     </dgm:pt>
     <dgm:pt modelId="{8E465062-3BF7-4C2E-A535-72AAD97A1C28}" type="pres">
       <dgm:prSet presAssocID="{B23D784F-6936-4048-AA28-681898207D6C}" presName="sibTrans" presStyleCnt="0"/>
@@ -3214,13 +3128,6 @@
         </dgm:presLayoutVars>
       </dgm:prSet>
       <dgm:spPr/>
-      <dgm:t>
-        <a:bodyPr/>
-        <a:lstStyle/>
-        <a:p>
-          <a:endParaRPr lang="en-US"/>
-        </a:p>
-      </dgm:t>
     </dgm:pt>
     <dgm:pt modelId="{DECF400E-4650-4EE3-A94C-F3F3899506E9}" type="pres">
       <dgm:prSet presAssocID="{00E4BA9D-9C64-4D2D-BBFC-8FDDFEDC97A6}" presName="sibTrans" presStyleCnt="0"/>
@@ -3233,13 +3140,6 @@
         </dgm:presLayoutVars>
       </dgm:prSet>
       <dgm:spPr/>
-      <dgm:t>
-        <a:bodyPr/>
-        <a:lstStyle/>
-        <a:p>
-          <a:endParaRPr lang="en-US"/>
-        </a:p>
-      </dgm:t>
     </dgm:pt>
   </dgm:ptLst>
   <dgm:cxnLst>
@@ -3296,10 +3196,9 @@
         <a:lstStyle/>
         <a:p>
           <a:r>
-            <a:rPr lang="en-US" dirty="0" smtClean="0"/>
+            <a:rPr lang="en-US" dirty="0"/>
             <a:t>Transaction Chain</a:t>
           </a:r>
-          <a:endParaRPr lang="en-US" dirty="0"/>
         </a:p>
       </dgm:t>
     </dgm:pt>
@@ -3333,10 +3232,9 @@
         <a:lstStyle/>
         <a:p>
           <a:r>
-            <a:rPr lang="en-US" dirty="0" smtClean="0"/>
+            <a:rPr lang="en-US" dirty="0"/>
             <a:t>History of ownership</a:t>
           </a:r>
-          <a:endParaRPr lang="en-US" dirty="0"/>
         </a:p>
       </dgm:t>
     </dgm:pt>
@@ -3370,10 +3268,9 @@
         <a:lstStyle/>
         <a:p>
           <a:r>
-            <a:rPr lang="en-US" dirty="0" smtClean="0"/>
+            <a:rPr lang="en-US" dirty="0"/>
             <a:t>Block Chain</a:t>
           </a:r>
-          <a:endParaRPr lang="en-US" dirty="0"/>
         </a:p>
       </dgm:t>
     </dgm:pt>
@@ -3407,10 +3304,9 @@
         <a:lstStyle/>
         <a:p>
           <a:r>
-            <a:rPr lang="en-US" dirty="0" smtClean="0"/>
+            <a:rPr lang="en-US" dirty="0"/>
             <a:t>Transaction ordering</a:t>
           </a:r>
-          <a:endParaRPr lang="en-US" dirty="0"/>
         </a:p>
       </dgm:t>
     </dgm:pt>
@@ -3445,13 +3341,6 @@
         </dgm:presLayoutVars>
       </dgm:prSet>
       <dgm:spPr/>
-      <dgm:t>
-        <a:bodyPr/>
-        <a:lstStyle/>
-        <a:p>
-          <a:endParaRPr lang="en-US"/>
-        </a:p>
-      </dgm:t>
     </dgm:pt>
     <dgm:pt modelId="{69B94A16-A41C-427A-9B2A-547FE7CEB626}" type="pres">
       <dgm:prSet presAssocID="{F8B3649D-EFD3-4015-809C-010F3236FBA3}" presName="linNode" presStyleCnt="0"/>
@@ -3464,13 +3353,6 @@
         </dgm:presLayoutVars>
       </dgm:prSet>
       <dgm:spPr/>
-      <dgm:t>
-        <a:bodyPr/>
-        <a:lstStyle/>
-        <a:p>
-          <a:endParaRPr lang="en-US"/>
-        </a:p>
-      </dgm:t>
     </dgm:pt>
     <dgm:pt modelId="{03F9F80C-D9BD-45B2-9852-474D800B987F}" type="pres">
       <dgm:prSet presAssocID="{F8B3649D-EFD3-4015-809C-010F3236FBA3}" presName="childShp" presStyleLbl="bgAccFollowNode1" presStyleIdx="0" presStyleCnt="2">
@@ -3479,13 +3361,6 @@
         </dgm:presLayoutVars>
       </dgm:prSet>
       <dgm:spPr/>
-      <dgm:t>
-        <a:bodyPr/>
-        <a:lstStyle/>
-        <a:p>
-          <a:endParaRPr lang="en-US"/>
-        </a:p>
-      </dgm:t>
     </dgm:pt>
     <dgm:pt modelId="{8DB40013-62A8-4162-820E-A9BAA166DC4F}" type="pres">
       <dgm:prSet presAssocID="{7731F27E-3DFA-4B9D-A81F-93B6AEDA9E88}" presName="spacing" presStyleCnt="0"/>
@@ -3502,13 +3377,6 @@
         </dgm:presLayoutVars>
       </dgm:prSet>
       <dgm:spPr/>
-      <dgm:t>
-        <a:bodyPr/>
-        <a:lstStyle/>
-        <a:p>
-          <a:endParaRPr lang="en-US"/>
-        </a:p>
-      </dgm:t>
     </dgm:pt>
     <dgm:pt modelId="{14971869-9371-47BE-8245-191314E4B422}" type="pres">
       <dgm:prSet presAssocID="{B8590294-4666-4AF7-8309-E4499939F9D1}" presName="childShp" presStyleLbl="bgAccFollowNode1" presStyleIdx="1" presStyleCnt="2">
@@ -3517,13 +3385,6 @@
         </dgm:presLayoutVars>
       </dgm:prSet>
       <dgm:spPr/>
-      <dgm:t>
-        <a:bodyPr/>
-        <a:lstStyle/>
-        <a:p>
-          <a:endParaRPr lang="en-US"/>
-        </a:p>
-      </dgm:t>
     </dgm:pt>
   </dgm:ptLst>
   <dgm:cxnLst>
@@ -3622,7 +3483,7 @@
         </a:bodyPr>
         <a:lstStyle/>
         <a:p>
-          <a:pPr lvl="0" algn="ctr" defTabSz="1066800">
+          <a:pPr marL="0" lvl="0" indent="0" algn="ctr" defTabSz="1066800">
             <a:lnSpc>
               <a:spcPct val="90000"/>
             </a:lnSpc>
@@ -3632,12 +3493,12 @@
             <a:spcAft>
               <a:spcPct val="35000"/>
             </a:spcAft>
+            <a:buNone/>
           </a:pPr>
           <a:r>
-            <a:rPr lang="en-US" sz="2400" kern="1200" dirty="0" smtClean="0"/>
+            <a:rPr lang="en-US" sz="2400" kern="1200" dirty="0"/>
             <a:t>Master-Slave</a:t>
           </a:r>
-          <a:endParaRPr lang="en-US" sz="2400" kern="1200" dirty="0"/>
         </a:p>
       </dsp:txBody>
       <dsp:txXfrm>
@@ -3703,7 +3564,7 @@
         </a:bodyPr>
         <a:lstStyle/>
         <a:p>
-          <a:pPr lvl="0" algn="ctr" defTabSz="1066800">
+          <a:pPr marL="0" lvl="0" indent="0" algn="ctr" defTabSz="1066800">
             <a:lnSpc>
               <a:spcPct val="90000"/>
             </a:lnSpc>
@@ -3713,12 +3574,12 @@
             <a:spcAft>
               <a:spcPct val="35000"/>
             </a:spcAft>
+            <a:buNone/>
           </a:pPr>
           <a:r>
-            <a:rPr lang="en-US" sz="2400" kern="1200" dirty="0" smtClean="0"/>
+            <a:rPr lang="en-US" sz="2400" kern="1200" dirty="0"/>
             <a:t>Peer to Peer</a:t>
           </a:r>
-          <a:endParaRPr lang="en-US" sz="2400" kern="1200" dirty="0"/>
         </a:p>
       </dsp:txBody>
       <dsp:txXfrm>
@@ -3882,7 +3743,7 @@
         </a:bodyPr>
         <a:lstStyle/>
         <a:p>
-          <a:pPr lvl="0" algn="ctr" defTabSz="889000">
+          <a:pPr marL="0" lvl="0" indent="0" algn="ctr" defTabSz="889000">
             <a:lnSpc>
               <a:spcPct val="90000"/>
             </a:lnSpc>
@@ -3892,12 +3753,12 @@
             <a:spcAft>
               <a:spcPct val="35000"/>
             </a:spcAft>
+            <a:buNone/>
           </a:pPr>
           <a:r>
-            <a:rPr lang="en-US" sz="2000" kern="1200" dirty="0" smtClean="0"/>
+            <a:rPr lang="en-US" sz="2000" kern="1200" dirty="0"/>
             <a:t>Updates propagate to replicas</a:t>
           </a:r>
-          <a:endParaRPr lang="en-US" sz="2000" kern="1200" dirty="0"/>
         </a:p>
       </dsp:txBody>
       <dsp:txXfrm>
@@ -3959,7 +3820,7 @@
         </a:bodyPr>
         <a:lstStyle/>
         <a:p>
-          <a:pPr lvl="0" algn="ctr" defTabSz="889000">
+          <a:pPr marL="0" lvl="0" indent="0" algn="ctr" defTabSz="889000">
             <a:lnSpc>
               <a:spcPct val="90000"/>
             </a:lnSpc>
@@ -3969,12 +3830,12 @@
             <a:spcAft>
               <a:spcPct val="35000"/>
             </a:spcAft>
+            <a:buNone/>
           </a:pPr>
           <a:r>
-            <a:rPr lang="en-US" sz="2000" kern="1200" dirty="0" smtClean="0"/>
+            <a:rPr lang="en-US" sz="2000" kern="1200" dirty="0"/>
             <a:t>Masterless: all copies equal</a:t>
           </a:r>
-          <a:endParaRPr lang="en-US" sz="2000" kern="1200" dirty="0"/>
         </a:p>
       </dsp:txBody>
       <dsp:txXfrm>
@@ -4036,7 +3897,7 @@
         </a:bodyPr>
         <a:lstStyle/>
         <a:p>
-          <a:pPr lvl="0" algn="ctr" defTabSz="889000">
+          <a:pPr marL="0" lvl="0" indent="0" algn="ctr" defTabSz="889000">
             <a:lnSpc>
               <a:spcPct val="90000"/>
             </a:lnSpc>
@@ -4046,12 +3907,12 @@
             <a:spcAft>
               <a:spcPct val="35000"/>
             </a:spcAft>
+            <a:buNone/>
           </a:pPr>
           <a:r>
-            <a:rPr lang="en-US" sz="2000" kern="1200" dirty="0" smtClean="0"/>
+            <a:rPr lang="en-US" sz="2000" kern="1200" dirty="0"/>
             <a:t>Single point of failure</a:t>
           </a:r>
-          <a:endParaRPr lang="en-US" sz="2000" kern="1200" dirty="0"/>
         </a:p>
       </dsp:txBody>
       <dsp:txXfrm>
@@ -4113,7 +3974,7 @@
         </a:bodyPr>
         <a:lstStyle/>
         <a:p>
-          <a:pPr lvl="0" algn="ctr" defTabSz="889000">
+          <a:pPr marL="0" lvl="0" indent="0" algn="ctr" defTabSz="889000">
             <a:lnSpc>
               <a:spcPct val="90000"/>
             </a:lnSpc>
@@ -4123,12 +3984,12 @@
             <a:spcAft>
               <a:spcPct val="35000"/>
             </a:spcAft>
+            <a:buNone/>
           </a:pPr>
           <a:r>
-            <a:rPr lang="en-US" sz="2000" kern="1200" dirty="0" smtClean="0"/>
+            <a:rPr lang="en-US" sz="2000" kern="1200" dirty="0"/>
             <a:t>Single copy of data</a:t>
           </a:r>
-          <a:endParaRPr lang="en-US" sz="2000" kern="1200" dirty="0"/>
         </a:p>
       </dsp:txBody>
       <dsp:txXfrm>
@@ -4202,7 +4063,7 @@
         </a:bodyPr>
         <a:lstStyle/>
         <a:p>
-          <a:pPr lvl="0" algn="ctr" defTabSz="977900">
+          <a:pPr marL="0" lvl="0" indent="0" algn="ctr" defTabSz="977900">
             <a:lnSpc>
               <a:spcPct val="90000"/>
             </a:lnSpc>
@@ -4212,14 +4073,15 @@
             <a:spcAft>
               <a:spcPct val="35000"/>
             </a:spcAft>
+            <a:buNone/>
           </a:pPr>
           <a:r>
-            <a:rPr lang="en-US" sz="2200" kern="1200" dirty="0" smtClean="0"/>
+            <a:rPr lang="en-US" sz="2200" kern="1200" dirty="0"/>
             <a:t>Distributed database</a:t>
           </a:r>
         </a:p>
         <a:p>
-          <a:pPr lvl="0" algn="ctr" defTabSz="977900">
+          <a:pPr marL="0" lvl="0" indent="0" algn="ctr" defTabSz="977900">
             <a:lnSpc>
               <a:spcPct val="90000"/>
             </a:lnSpc>
@@ -4229,12 +4091,12 @@
             <a:spcAft>
               <a:spcPct val="35000"/>
             </a:spcAft>
+            <a:buNone/>
           </a:pPr>
           <a:r>
-            <a:rPr lang="en-US" sz="2200" kern="1200" dirty="0" smtClean="0"/>
+            <a:rPr lang="en-US" sz="2200" kern="1200" dirty="0"/>
             <a:t>Peer to Peer</a:t>
           </a:r>
-          <a:endParaRPr lang="en-US" sz="2200" kern="1200" dirty="0"/>
         </a:p>
       </dsp:txBody>
       <dsp:txXfrm>
@@ -4296,7 +4158,7 @@
         </a:bodyPr>
         <a:lstStyle/>
         <a:p>
-          <a:pPr lvl="0" algn="ctr" defTabSz="977900">
+          <a:pPr marL="0" lvl="0" indent="0" algn="ctr" defTabSz="977900">
             <a:lnSpc>
               <a:spcPct val="90000"/>
             </a:lnSpc>
@@ -4306,12 +4168,12 @@
             <a:spcAft>
               <a:spcPct val="35000"/>
             </a:spcAft>
+            <a:buNone/>
           </a:pPr>
           <a:r>
-            <a:rPr lang="en-US" sz="2200" kern="1200" dirty="0" smtClean="0"/>
+            <a:rPr lang="en-US" sz="2200" kern="1200" dirty="0"/>
             <a:t>Transparent &amp; Incorruptible</a:t>
           </a:r>
-          <a:endParaRPr lang="en-US" sz="2200" kern="1200" dirty="0"/>
         </a:p>
       </dsp:txBody>
       <dsp:txXfrm>
@@ -4373,7 +4235,7 @@
         </a:bodyPr>
         <a:lstStyle/>
         <a:p>
-          <a:pPr lvl="0" algn="ctr" defTabSz="977900">
+          <a:pPr marL="0" lvl="0" indent="0" algn="ctr" defTabSz="977900">
             <a:lnSpc>
               <a:spcPct val="90000"/>
             </a:lnSpc>
@@ -4383,9 +4245,10 @@
             <a:spcAft>
               <a:spcPct val="35000"/>
             </a:spcAft>
+            <a:buNone/>
           </a:pPr>
           <a:r>
-            <a:rPr lang="en-US" sz="2200" kern="1200" dirty="0" smtClean="0"/>
+            <a:rPr lang="en-US" sz="2200" kern="1200" dirty="0"/>
             <a:t>No single point of failure </a:t>
           </a:r>
         </a:p>
@@ -4449,7 +4312,7 @@
         </a:bodyPr>
         <a:lstStyle/>
         <a:p>
-          <a:pPr lvl="0" algn="ctr" defTabSz="977900">
+          <a:pPr marL="0" lvl="0" indent="0" algn="ctr" defTabSz="977900">
             <a:lnSpc>
               <a:spcPct val="90000"/>
             </a:lnSpc>
@@ -4459,14 +4322,15 @@
             <a:spcAft>
               <a:spcPct val="35000"/>
             </a:spcAft>
+            <a:buNone/>
           </a:pPr>
           <a:r>
-            <a:rPr lang="en-US" sz="2200" kern="1200" dirty="0" smtClean="0"/>
+            <a:rPr lang="en-US" sz="2200" kern="1200" dirty="0"/>
             <a:t>Decentralized consensus</a:t>
           </a:r>
         </a:p>
         <a:p>
-          <a:pPr lvl="0" algn="ctr" defTabSz="977900">
+          <a:pPr marL="0" lvl="0" indent="0" algn="ctr" defTabSz="977900">
             <a:lnSpc>
               <a:spcPct val="90000"/>
             </a:lnSpc>
@@ -4476,9 +4340,10 @@
             <a:spcAft>
               <a:spcPct val="35000"/>
             </a:spcAft>
+            <a:buNone/>
           </a:pPr>
           <a:r>
-            <a:rPr lang="en-US" sz="2200" kern="1200" smtClean="0"/>
+            <a:rPr lang="en-US" sz="2200" kern="1200"/>
             <a:t>(not controlled by any single identity)</a:t>
           </a:r>
           <a:endParaRPr lang="en-US" sz="2200" kern="1200" dirty="0"/>
@@ -4543,7 +4408,7 @@
         </a:bodyPr>
         <a:lstStyle/>
         <a:p>
-          <a:pPr lvl="0" algn="ctr" defTabSz="977900">
+          <a:pPr marL="0" lvl="0" indent="0" algn="ctr" defTabSz="977900">
             <a:lnSpc>
               <a:spcPct val="90000"/>
             </a:lnSpc>
@@ -4553,12 +4418,12 @@
             <a:spcAft>
               <a:spcPct val="35000"/>
             </a:spcAft>
+            <a:buNone/>
           </a:pPr>
           <a:r>
-            <a:rPr lang="en-US" sz="2200" kern="1200" dirty="0" smtClean="0"/>
+            <a:rPr lang="en-US" sz="2200" kern="1200" dirty="0"/>
             <a:t>Enhanced security</a:t>
           </a:r>
-          <a:endParaRPr lang="en-US" sz="2200" kern="1200" dirty="0"/>
         </a:p>
       </dsp:txBody>
       <dsp:txXfrm>
@@ -4647,13 +4512,12 @@
             <a:spcAft>
               <a:spcPct val="15000"/>
             </a:spcAft>
-            <a:buChar char="••"/>
+            <a:buChar char="•"/>
           </a:pPr>
           <a:r>
-            <a:rPr lang="en-US" sz="2200" kern="1200" dirty="0" smtClean="0"/>
+            <a:rPr lang="en-US" sz="2200" kern="1200" dirty="0"/>
             <a:t>History of ownership</a:t>
           </a:r>
-          <a:endParaRPr lang="en-US" sz="2200" kern="1200" dirty="0"/>
         </a:p>
       </dsp:txBody>
       <dsp:txXfrm>
@@ -4715,7 +4579,7 @@
         </a:bodyPr>
         <a:lstStyle/>
         <a:p>
-          <a:pPr lvl="0" algn="ctr" defTabSz="755650">
+          <a:pPr marL="0" lvl="0" indent="0" algn="ctr" defTabSz="755650">
             <a:lnSpc>
               <a:spcPct val="90000"/>
             </a:lnSpc>
@@ -4725,12 +4589,12 @@
             <a:spcAft>
               <a:spcPct val="35000"/>
             </a:spcAft>
+            <a:buNone/>
           </a:pPr>
           <a:r>
-            <a:rPr lang="en-US" sz="1700" kern="1200" dirty="0" smtClean="0"/>
+            <a:rPr lang="en-US" sz="1700" kern="1200" dirty="0"/>
             <a:t>Transaction Chain</a:t>
           </a:r>
-          <a:endParaRPr lang="en-US" sz="1700" kern="1200" dirty="0"/>
         </a:p>
       </dsp:txBody>
       <dsp:txXfrm>
@@ -4807,13 +4671,12 @@
             <a:spcAft>
               <a:spcPct val="15000"/>
             </a:spcAft>
-            <a:buChar char="••"/>
+            <a:buChar char="•"/>
           </a:pPr>
           <a:r>
-            <a:rPr lang="en-US" sz="2200" kern="1200" dirty="0" smtClean="0"/>
+            <a:rPr lang="en-US" sz="2200" kern="1200" dirty="0"/>
             <a:t>Transaction ordering</a:t>
           </a:r>
-          <a:endParaRPr lang="en-US" sz="2200" kern="1200" dirty="0"/>
         </a:p>
       </dsp:txBody>
       <dsp:txXfrm>
@@ -4875,7 +4738,7 @@
         </a:bodyPr>
         <a:lstStyle/>
         <a:p>
-          <a:pPr lvl="0" algn="ctr" defTabSz="755650">
+          <a:pPr marL="0" lvl="0" indent="0" algn="ctr" defTabSz="755650">
             <a:lnSpc>
               <a:spcPct val="90000"/>
             </a:lnSpc>
@@ -4885,12 +4748,12 @@
             <a:spcAft>
               <a:spcPct val="35000"/>
             </a:spcAft>
+            <a:buNone/>
           </a:pPr>
           <a:r>
-            <a:rPr lang="en-US" sz="1700" kern="1200" dirty="0" smtClean="0"/>
+            <a:rPr lang="en-US" sz="1700" kern="1200" dirty="0"/>
             <a:t>Block Chain</a:t>
           </a:r>
-          <a:endParaRPr lang="en-US" sz="1700" kern="1200" dirty="0"/>
         </a:p>
       </dsp:txBody>
       <dsp:txXfrm>
@@ -11598,38 +11461,37 @@
           <a:p>
             <a:pPr lvl="0"/>
             <a:r>
-              <a:rPr lang="en-US" smtClean="0"/>
+              <a:rPr lang="en-US"/>
               <a:t>Click to edit Master text styles</a:t>
             </a:r>
           </a:p>
           <a:p>
             <a:pPr lvl="1"/>
             <a:r>
-              <a:rPr lang="en-US" smtClean="0"/>
+              <a:rPr lang="en-US"/>
               <a:t>Second level</a:t>
             </a:r>
           </a:p>
           <a:p>
             <a:pPr lvl="2"/>
             <a:r>
-              <a:rPr lang="en-US" smtClean="0"/>
+              <a:rPr lang="en-US"/>
               <a:t>Third level</a:t>
             </a:r>
           </a:p>
           <a:p>
             <a:pPr lvl="3"/>
             <a:r>
-              <a:rPr lang="en-US" smtClean="0"/>
+              <a:rPr lang="en-US"/>
               <a:t>Fourth level</a:t>
             </a:r>
           </a:p>
           <a:p>
             <a:pPr lvl="4"/>
             <a:r>
-              <a:rPr lang="en-US" smtClean="0"/>
+              <a:rPr lang="en-US"/>
               <a:t>Fifth level</a:t>
             </a:r>
-            <a:endParaRPr lang="en-US"/>
           </a:p>
         </p:txBody>
       </p:sp>
@@ -11846,7 +11708,10 @@
           <a:bodyPr/>
           <a:lstStyle/>
           <a:p>
-            <a:endParaRPr lang="en-US" dirty="0"/>
+            <a:r>
+              <a:rPr lang="en-US" dirty="0"/>
+              <a:t>https://bitcoin.org/en/</a:t>
+            </a:r>
           </a:p>
         </p:txBody>
       </p:sp>
@@ -11867,7 +11732,7 @@
           <a:p>
             <a:fld id="{0DEC71BC-50C3-43D2-8885-28C91E7E4DB0}" type="slidenum">
               <a:rPr lang="en-US" smtClean="0"/>
-              <a:t>12</a:t>
+              <a:t>7</a:t>
             </a:fld>
             <a:endParaRPr lang="en-US"/>
           </a:p>
@@ -11876,7 +11741,7 @@
     </p:spTree>
     <p:extLst>
       <p:ext uri="{BB962C8B-B14F-4D97-AF65-F5344CB8AC3E}">
-        <p14:creationId xmlns:p14="http://schemas.microsoft.com/office/powerpoint/2010/main" val="718543089"/>
+        <p14:creationId xmlns:p14="http://schemas.microsoft.com/office/powerpoint/2010/main" val="921459114"/>
       </p:ext>
     </p:extLst>
   </p:cSld>
@@ -11951,7 +11816,7 @@
           <a:p>
             <a:fld id="{0DEC71BC-50C3-43D2-8885-28C91E7E4DB0}" type="slidenum">
               <a:rPr lang="en-US" smtClean="0"/>
-              <a:t>15</a:t>
+              <a:t>12</a:t>
             </a:fld>
             <a:endParaRPr lang="en-US"/>
           </a:p>
@@ -11960,7 +11825,7 @@
     </p:spTree>
     <p:extLst>
       <p:ext uri="{BB962C8B-B14F-4D97-AF65-F5344CB8AC3E}">
-        <p14:creationId xmlns:p14="http://schemas.microsoft.com/office/powerpoint/2010/main" val="823567310"/>
+        <p14:creationId xmlns:p14="http://schemas.microsoft.com/office/powerpoint/2010/main" val="718543089"/>
       </p:ext>
     </p:extLst>
   </p:cSld>
@@ -12014,6 +11879,90 @@
           <a:bodyPr/>
           <a:lstStyle/>
           <a:p>
+            <a:endParaRPr lang="en-US" dirty="0"/>
+          </a:p>
+        </p:txBody>
+      </p:sp>
+      <p:sp>
+        <p:nvSpPr>
+          <p:cNvPr id="4" name="Slide Number Placeholder 3"/>
+          <p:cNvSpPr>
+            <a:spLocks noGrp="1"/>
+          </p:cNvSpPr>
+          <p:nvPr>
+            <p:ph type="sldNum" sz="quarter" idx="10"/>
+          </p:nvPr>
+        </p:nvSpPr>
+        <p:spPr/>
+        <p:txBody>
+          <a:bodyPr/>
+          <a:lstStyle/>
+          <a:p>
+            <a:fld id="{0DEC71BC-50C3-43D2-8885-28C91E7E4DB0}" type="slidenum">
+              <a:rPr lang="en-US" smtClean="0"/>
+              <a:t>15</a:t>
+            </a:fld>
+            <a:endParaRPr lang="en-US"/>
+          </a:p>
+        </p:txBody>
+      </p:sp>
+    </p:spTree>
+    <p:extLst>
+      <p:ext uri="{BB962C8B-B14F-4D97-AF65-F5344CB8AC3E}">
+        <p14:creationId xmlns:p14="http://schemas.microsoft.com/office/powerpoint/2010/main" val="823567310"/>
+      </p:ext>
+    </p:extLst>
+  </p:cSld>
+  <p:clrMapOvr>
+    <a:masterClrMapping/>
+  </p:clrMapOvr>
+</p:notes>
+</file>
+
+<file path=ppt/notesSlides/notesSlide4.xml><?xml version="1.0" encoding="utf-8"?>
+<p:notes xmlns:a="http://schemas.openxmlformats.org/drawingml/2006/main" xmlns:r="http://schemas.openxmlformats.org/officeDocument/2006/relationships" xmlns:p="http://schemas.openxmlformats.org/presentationml/2006/main">
+  <p:cSld>
+    <p:spTree>
+      <p:nvGrpSpPr>
+        <p:cNvPr id="1" name=""/>
+        <p:cNvGrpSpPr/>
+        <p:nvPr/>
+      </p:nvGrpSpPr>
+      <p:grpSpPr>
+        <a:xfrm>
+          <a:off x="0" y="0"/>
+          <a:ext cx="0" cy="0"/>
+          <a:chOff x="0" y="0"/>
+          <a:chExt cx="0" cy="0"/>
+        </a:xfrm>
+      </p:grpSpPr>
+      <p:sp>
+        <p:nvSpPr>
+          <p:cNvPr id="2" name="Slide Image Placeholder 1"/>
+          <p:cNvSpPr>
+            <a:spLocks noGrp="1" noRot="1" noChangeAspect="1"/>
+          </p:cNvSpPr>
+          <p:nvPr>
+            <p:ph type="sldImg"/>
+          </p:nvPr>
+        </p:nvSpPr>
+        <p:spPr/>
+      </p:sp>
+      <p:sp>
+        <p:nvSpPr>
+          <p:cNvPr id="3" name="Notes Placeholder 2"/>
+          <p:cNvSpPr>
+            <a:spLocks noGrp="1"/>
+          </p:cNvSpPr>
+          <p:nvPr>
+            <p:ph type="body" idx="1"/>
+          </p:nvPr>
+        </p:nvSpPr>
+        <p:spPr/>
+        <p:txBody>
+          <a:bodyPr/>
+          <a:lstStyle/>
+          <a:p>
             <a:pPr marL="0" marR="0" lvl="0" indent="0" algn="l" defTabSz="914400" rtl="0" eaLnBrk="1" fontAlgn="auto" latinLnBrk="0" hangingPunct="1">
               <a:lnSpc>
                 <a:spcPct val="100000"/>
@@ -12032,7 +11981,7 @@
               <a:defRPr/>
             </a:pPr>
             <a:r>
-              <a:rPr lang="en-US" sz="1200" dirty="0" smtClean="0">
+              <a:rPr lang="en-US" sz="1200" dirty="0">
                 <a:solidFill>
                   <a:srgbClr val="FF0000"/>
                 </a:solidFill>
@@ -12040,10 +11989,10 @@
               <a:t>System is vulnerable to double spend attack towards the end of the chain. Thus it is recommended to wait out a few blocks to be solved to ensure that the transaction is complete</a:t>
             </a:r>
             <a:r>
-              <a:rPr lang="en-US" sz="1200" dirty="0" smtClean="0"/>
+              <a:rPr lang="en-US" sz="1200" dirty="0"/>
               <a:t>.</a:t>
             </a:r>
-            <a:endParaRPr lang="en-US" dirty="0" smtClean="0"/>
+            <a:endParaRPr lang="en-US" dirty="0"/>
           </a:p>
           <a:p>
             <a:endParaRPr lang="en-US" dirty="0"/>
@@ -12147,7 +12096,7 @@
           </a:lstStyle>
           <a:p>
             <a:r>
-              <a:rPr lang="en-US" smtClean="0"/>
+              <a:rPr lang="en-US"/>
               <a:t>Click to edit Master title style</a:t>
             </a:r>
             <a:endParaRPr lang="en-US" dirty="0"/>
@@ -12220,7 +12169,7 @@
           </a:lstStyle>
           <a:p>
             <a:r>
-              <a:rPr lang="en-US" smtClean="0"/>
+              <a:rPr lang="en-US"/>
               <a:t>Click to edit Master subtitle style</a:t>
             </a:r>
             <a:endParaRPr lang="en-US" dirty="0"/>
@@ -12411,7 +12360,7 @@
           <a:lstStyle/>
           <a:p>
             <a:r>
-              <a:rPr lang="en-US" smtClean="0"/>
+              <a:rPr lang="en-US"/>
               <a:t>Click to edit Master title style</a:t>
             </a:r>
             <a:endParaRPr lang="en-US" dirty="0"/>
@@ -12435,35 +12384,35 @@
           <a:p>
             <a:pPr lvl="0"/>
             <a:r>
-              <a:rPr lang="en-US" smtClean="0"/>
+              <a:rPr lang="en-US"/>
               <a:t>Click to edit Master text styles</a:t>
             </a:r>
           </a:p>
           <a:p>
             <a:pPr lvl="1"/>
             <a:r>
-              <a:rPr lang="en-US" smtClean="0"/>
+              <a:rPr lang="en-US"/>
               <a:t>Second level</a:t>
             </a:r>
           </a:p>
           <a:p>
             <a:pPr lvl="2"/>
             <a:r>
-              <a:rPr lang="en-US" smtClean="0"/>
+              <a:rPr lang="en-US"/>
               <a:t>Third level</a:t>
             </a:r>
           </a:p>
           <a:p>
             <a:pPr lvl="3"/>
             <a:r>
-              <a:rPr lang="en-US" smtClean="0"/>
+              <a:rPr lang="en-US"/>
               <a:t>Fourth level</a:t>
             </a:r>
           </a:p>
           <a:p>
             <a:pPr lvl="4"/>
             <a:r>
-              <a:rPr lang="en-US" smtClean="0"/>
+              <a:rPr lang="en-US"/>
               <a:t>Fifth level</a:t>
             </a:r>
             <a:endParaRPr lang="en-US" dirty="0"/>
@@ -12586,7 +12535,7 @@
           <a:lstStyle/>
           <a:p>
             <a:r>
-              <a:rPr lang="en-US" smtClean="0"/>
+              <a:rPr lang="en-US"/>
               <a:t>Click to edit Master title style</a:t>
             </a:r>
             <a:endParaRPr lang="en-US" dirty="0"/>
@@ -12615,35 +12564,35 @@
           <a:p>
             <a:pPr lvl="0"/>
             <a:r>
-              <a:rPr lang="en-US" smtClean="0"/>
+              <a:rPr lang="en-US"/>
               <a:t>Click to edit Master text styles</a:t>
             </a:r>
           </a:p>
           <a:p>
             <a:pPr lvl="1"/>
             <a:r>
-              <a:rPr lang="en-US" smtClean="0"/>
+              <a:rPr lang="en-US"/>
               <a:t>Second level</a:t>
             </a:r>
           </a:p>
           <a:p>
             <a:pPr lvl="2"/>
             <a:r>
-              <a:rPr lang="en-US" smtClean="0"/>
+              <a:rPr lang="en-US"/>
               <a:t>Third level</a:t>
             </a:r>
           </a:p>
           <a:p>
             <a:pPr lvl="3"/>
             <a:r>
-              <a:rPr lang="en-US" smtClean="0"/>
+              <a:rPr lang="en-US"/>
               <a:t>Fourth level</a:t>
             </a:r>
           </a:p>
           <a:p>
             <a:pPr lvl="4"/>
             <a:r>
-              <a:rPr lang="en-US" smtClean="0"/>
+              <a:rPr lang="en-US"/>
               <a:t>Fifth level</a:t>
             </a:r>
             <a:endParaRPr lang="en-US" dirty="0"/>
@@ -12761,7 +12710,7 @@
           <a:lstStyle/>
           <a:p>
             <a:r>
-              <a:rPr lang="en-US" smtClean="0"/>
+              <a:rPr lang="en-US"/>
               <a:t>Click to edit Master title style</a:t>
             </a:r>
             <a:endParaRPr lang="en-US" dirty="0"/>
@@ -12785,35 +12734,35 @@
           <a:p>
             <a:pPr lvl="0"/>
             <a:r>
-              <a:rPr lang="en-US" smtClean="0"/>
+              <a:rPr lang="en-US"/>
               <a:t>Click to edit Master text styles</a:t>
             </a:r>
           </a:p>
           <a:p>
             <a:pPr lvl="1"/>
             <a:r>
-              <a:rPr lang="en-US" smtClean="0"/>
+              <a:rPr lang="en-US"/>
               <a:t>Second level</a:t>
             </a:r>
           </a:p>
           <a:p>
             <a:pPr lvl="2"/>
             <a:r>
-              <a:rPr lang="en-US" smtClean="0"/>
+              <a:rPr lang="en-US"/>
               <a:t>Third level</a:t>
             </a:r>
           </a:p>
           <a:p>
             <a:pPr lvl="3"/>
             <a:r>
-              <a:rPr lang="en-US" smtClean="0"/>
+              <a:rPr lang="en-US"/>
               <a:t>Fourth level</a:t>
             </a:r>
           </a:p>
           <a:p>
             <a:pPr lvl="4"/>
             <a:r>
-              <a:rPr lang="en-US" smtClean="0"/>
+              <a:rPr lang="en-US"/>
               <a:t>Fifth level</a:t>
             </a:r>
             <a:endParaRPr lang="en-US" dirty="0"/>
@@ -12945,7 +12894,7 @@
           </a:lstStyle>
           <a:p>
             <a:r>
-              <a:rPr lang="en-US" smtClean="0"/>
+              <a:rPr lang="en-US"/>
               <a:t>Click to edit Master title style</a:t>
             </a:r>
             <a:endParaRPr lang="en-US" dirty="0"/>
@@ -13068,7 +13017,7 @@
           <a:p>
             <a:pPr lvl="0"/>
             <a:r>
-              <a:rPr lang="en-US" smtClean="0"/>
+              <a:rPr lang="en-US"/>
               <a:t>Click to edit Master text styles</a:t>
             </a:r>
           </a:p>
@@ -13223,7 +13172,7 @@
           <a:lstStyle/>
           <a:p>
             <a:r>
-              <a:rPr lang="en-US" smtClean="0"/>
+              <a:rPr lang="en-US"/>
               <a:t>Click to edit Master title style</a:t>
             </a:r>
             <a:endParaRPr lang="en-US" dirty="0"/>
@@ -13280,35 +13229,35 @@
           <a:p>
             <a:pPr lvl="0"/>
             <a:r>
-              <a:rPr lang="en-US" smtClean="0"/>
+              <a:rPr lang="en-US"/>
               <a:t>Click to edit Master text styles</a:t>
             </a:r>
           </a:p>
           <a:p>
             <a:pPr lvl="1"/>
             <a:r>
-              <a:rPr lang="en-US" smtClean="0"/>
+              <a:rPr lang="en-US"/>
               <a:t>Second level</a:t>
             </a:r>
           </a:p>
           <a:p>
             <a:pPr lvl="2"/>
             <a:r>
-              <a:rPr lang="en-US" smtClean="0"/>
+              <a:rPr lang="en-US"/>
               <a:t>Third level</a:t>
             </a:r>
           </a:p>
           <a:p>
             <a:pPr lvl="3"/>
             <a:r>
-              <a:rPr lang="en-US" smtClean="0"/>
+              <a:rPr lang="en-US"/>
               <a:t>Fourth level</a:t>
             </a:r>
           </a:p>
           <a:p>
             <a:pPr lvl="4"/>
             <a:r>
-              <a:rPr lang="en-US" smtClean="0"/>
+              <a:rPr lang="en-US"/>
               <a:t>Fifth level</a:t>
             </a:r>
             <a:endParaRPr lang="en-US" dirty="0"/>
@@ -13365,35 +13314,35 @@
           <a:p>
             <a:pPr lvl="0"/>
             <a:r>
-              <a:rPr lang="en-US" smtClean="0"/>
+              <a:rPr lang="en-US"/>
               <a:t>Click to edit Master text styles</a:t>
             </a:r>
           </a:p>
           <a:p>
             <a:pPr lvl="1"/>
             <a:r>
-              <a:rPr lang="en-US" smtClean="0"/>
+              <a:rPr lang="en-US"/>
               <a:t>Second level</a:t>
             </a:r>
           </a:p>
           <a:p>
             <a:pPr lvl="2"/>
             <a:r>
-              <a:rPr lang="en-US" smtClean="0"/>
+              <a:rPr lang="en-US"/>
               <a:t>Third level</a:t>
             </a:r>
           </a:p>
           <a:p>
             <a:pPr lvl="3"/>
             <a:r>
-              <a:rPr lang="en-US" smtClean="0"/>
+              <a:rPr lang="en-US"/>
               <a:t>Fourth level</a:t>
             </a:r>
           </a:p>
           <a:p>
             <a:pPr lvl="4"/>
             <a:r>
-              <a:rPr lang="en-US" smtClean="0"/>
+              <a:rPr lang="en-US"/>
               <a:t>Fifth level</a:t>
             </a:r>
             <a:endParaRPr lang="en-US" dirty="0"/>
@@ -13511,7 +13460,7 @@
           <a:lstStyle/>
           <a:p>
             <a:r>
-              <a:rPr lang="en-US" smtClean="0"/>
+              <a:rPr lang="en-US"/>
               <a:t>Click to edit Master title style</a:t>
             </a:r>
             <a:endParaRPr lang="en-US" dirty="0"/>
@@ -13586,7 +13535,7 @@
           <a:p>
             <a:pPr lvl="0"/>
             <a:r>
-              <a:rPr lang="en-US" smtClean="0"/>
+              <a:rPr lang="en-US"/>
               <a:t>Click to edit Master text styles</a:t>
             </a:r>
           </a:p>
@@ -13642,35 +13591,35 @@
           <a:p>
             <a:pPr lvl="0"/>
             <a:r>
-              <a:rPr lang="en-US" smtClean="0"/>
+              <a:rPr lang="en-US"/>
               <a:t>Click to edit Master text styles</a:t>
             </a:r>
           </a:p>
           <a:p>
             <a:pPr lvl="1"/>
             <a:r>
-              <a:rPr lang="en-US" smtClean="0"/>
+              <a:rPr lang="en-US"/>
               <a:t>Second level</a:t>
             </a:r>
           </a:p>
           <a:p>
             <a:pPr lvl="2"/>
             <a:r>
-              <a:rPr lang="en-US" smtClean="0"/>
+              <a:rPr lang="en-US"/>
               <a:t>Third level</a:t>
             </a:r>
           </a:p>
           <a:p>
             <a:pPr lvl="3"/>
             <a:r>
-              <a:rPr lang="en-US" smtClean="0"/>
+              <a:rPr lang="en-US"/>
               <a:t>Fourth level</a:t>
             </a:r>
           </a:p>
           <a:p>
             <a:pPr lvl="4"/>
             <a:r>
-              <a:rPr lang="en-US" smtClean="0"/>
+              <a:rPr lang="en-US"/>
               <a:t>Fifth level</a:t>
             </a:r>
             <a:endParaRPr lang="en-US" dirty="0"/>
@@ -13760,7 +13709,7 @@
               <a:buNone/>
             </a:pPr>
             <a:r>
-              <a:rPr lang="en-US" smtClean="0"/>
+              <a:rPr lang="en-US"/>
               <a:t>Click to edit Master text styles</a:t>
             </a:r>
           </a:p>
@@ -13816,35 +13765,35 @@
           <a:p>
             <a:pPr lvl="0"/>
             <a:r>
-              <a:rPr lang="en-US" smtClean="0"/>
+              <a:rPr lang="en-US"/>
               <a:t>Click to edit Master text styles</a:t>
             </a:r>
           </a:p>
           <a:p>
             <a:pPr lvl="1"/>
             <a:r>
-              <a:rPr lang="en-US" smtClean="0"/>
+              <a:rPr lang="en-US"/>
               <a:t>Second level</a:t>
             </a:r>
           </a:p>
           <a:p>
             <a:pPr lvl="2"/>
             <a:r>
-              <a:rPr lang="en-US" smtClean="0"/>
+              <a:rPr lang="en-US"/>
               <a:t>Third level</a:t>
             </a:r>
           </a:p>
           <a:p>
             <a:pPr lvl="3"/>
             <a:r>
-              <a:rPr lang="en-US" smtClean="0"/>
+              <a:rPr lang="en-US"/>
               <a:t>Fourth level</a:t>
             </a:r>
           </a:p>
           <a:p>
             <a:pPr lvl="4"/>
             <a:r>
-              <a:rPr lang="en-US" smtClean="0"/>
+              <a:rPr lang="en-US"/>
               <a:t>Fifth level</a:t>
             </a:r>
             <a:endParaRPr lang="en-US" dirty="0"/>
@@ -13962,7 +13911,7 @@
           <a:lstStyle/>
           <a:p>
             <a:r>
-              <a:rPr lang="en-US" smtClean="0"/>
+              <a:rPr lang="en-US"/>
               <a:t>Click to edit Master title style</a:t>
             </a:r>
             <a:endParaRPr lang="en-US" dirty="0"/>
@@ -14191,7 +14140,7 @@
           </a:lstStyle>
           <a:p>
             <a:r>
-              <a:rPr lang="en-US" smtClean="0"/>
+              <a:rPr lang="en-US"/>
               <a:t>Click to edit Master title style</a:t>
             </a:r>
             <a:endParaRPr lang="en-US" dirty="0"/>
@@ -14248,35 +14197,35 @@
           <a:p>
             <a:pPr lvl="0"/>
             <a:r>
-              <a:rPr lang="en-US" smtClean="0"/>
+              <a:rPr lang="en-US"/>
               <a:t>Click to edit Master text styles</a:t>
             </a:r>
           </a:p>
           <a:p>
             <a:pPr lvl="1"/>
             <a:r>
-              <a:rPr lang="en-US" smtClean="0"/>
+              <a:rPr lang="en-US"/>
               <a:t>Second level</a:t>
             </a:r>
           </a:p>
           <a:p>
             <a:pPr lvl="2"/>
             <a:r>
-              <a:rPr lang="en-US" smtClean="0"/>
+              <a:rPr lang="en-US"/>
               <a:t>Third level</a:t>
             </a:r>
           </a:p>
           <a:p>
             <a:pPr lvl="3"/>
             <a:r>
-              <a:rPr lang="en-US" smtClean="0"/>
+              <a:rPr lang="en-US"/>
               <a:t>Fourth level</a:t>
             </a:r>
           </a:p>
           <a:p>
             <a:pPr lvl="4"/>
             <a:r>
-              <a:rPr lang="en-US" smtClean="0"/>
+              <a:rPr lang="en-US"/>
               <a:t>Fifth level</a:t>
             </a:r>
             <a:endParaRPr lang="en-US" dirty="0"/>
@@ -14350,7 +14299,7 @@
           <a:p>
             <a:pPr lvl="0"/>
             <a:r>
-              <a:rPr lang="en-US" smtClean="0"/>
+              <a:rPr lang="en-US"/>
               <a:t>Click to edit Master text styles</a:t>
             </a:r>
           </a:p>
@@ -14525,7 +14474,7 @@
           </a:lstStyle>
           <a:p>
             <a:r>
-              <a:rPr lang="en-US" smtClean="0"/>
+              <a:rPr lang="en-US"/>
               <a:t>Click to edit Master title style</a:t>
             </a:r>
             <a:endParaRPr lang="en-US" dirty="0"/>
@@ -14597,7 +14546,7 @@
           </a:lstStyle>
           <a:p>
             <a:r>
-              <a:rPr lang="en-US" smtClean="0"/>
+              <a:rPr lang="en-US"/>
               <a:t>Click icon to add picture</a:t>
             </a:r>
             <a:endParaRPr lang="en-US" dirty="0"/>
@@ -14677,7 +14626,7 @@
           <a:p>
             <a:pPr lvl="0"/>
             <a:r>
-              <a:rPr lang="en-US" smtClean="0"/>
+              <a:rPr lang="en-US"/>
               <a:t>Click to edit Master text styles</a:t>
             </a:r>
           </a:p>
@@ -14849,7 +14798,7 @@
           <a:lstStyle/>
           <a:p>
             <a:r>
-              <a:rPr lang="en-US" smtClean="0"/>
+              <a:rPr lang="en-US"/>
               <a:t>Click to edit Master title style</a:t>
             </a:r>
             <a:endParaRPr lang="en-US" dirty="0"/>
@@ -14883,35 +14832,35 @@
           <a:p>
             <a:pPr lvl="0"/>
             <a:r>
-              <a:rPr lang="en-US" smtClean="0"/>
+              <a:rPr lang="en-US"/>
               <a:t>Click to edit Master text styles</a:t>
             </a:r>
           </a:p>
           <a:p>
             <a:pPr lvl="1"/>
             <a:r>
-              <a:rPr lang="en-US" smtClean="0"/>
+              <a:rPr lang="en-US"/>
               <a:t>Second level</a:t>
             </a:r>
           </a:p>
           <a:p>
             <a:pPr lvl="2"/>
             <a:r>
-              <a:rPr lang="en-US" smtClean="0"/>
+              <a:rPr lang="en-US"/>
               <a:t>Third level</a:t>
             </a:r>
           </a:p>
           <a:p>
             <a:pPr lvl="3"/>
             <a:r>
-              <a:rPr lang="en-US" smtClean="0"/>
+              <a:rPr lang="en-US"/>
               <a:t>Fourth level</a:t>
             </a:r>
           </a:p>
           <a:p>
             <a:pPr lvl="4"/>
             <a:r>
-              <a:rPr lang="en-US" smtClean="0"/>
+              <a:rPr lang="en-US"/>
               <a:t>Fifth level</a:t>
             </a:r>
             <a:endParaRPr lang="en-US" dirty="0"/>
@@ -15473,10 +15422,9 @@
               <a:buNone/>
             </a:pPr>
             <a:r>
-              <a:rPr lang="en-US" sz="4000" dirty="0" smtClean="0"/>
+              <a:rPr lang="en-US" sz="4000" dirty="0"/>
               <a:t>BLOCKCHAIN</a:t>
             </a:r>
-            <a:endParaRPr lang="en-US" sz="4000" dirty="0"/>
           </a:p>
         </p:txBody>
       </p:sp>
@@ -15750,7 +15698,7 @@
               <a:buNone/>
             </a:pPr>
             <a:r>
-              <a:rPr lang="en-US" sz="4000" dirty="0" smtClean="0"/>
+              <a:rPr lang="en-US" sz="4000" dirty="0"/>
               <a:t>Nirav Aga</a:t>
             </a:r>
           </a:p>
@@ -15760,7 +15708,7 @@
               <a:buNone/>
             </a:pPr>
             <a:r>
-              <a:rPr lang="en-US" sz="4000" dirty="0" smtClean="0"/>
+              <a:rPr lang="en-US" sz="4000" dirty="0"/>
               <a:t>Praneeta Jhanwar</a:t>
             </a:r>
           </a:p>
@@ -15776,13 +15724,6 @@
   <p:clrMapOvr>
     <a:masterClrMapping/>
   </p:clrMapOvr>
-  <p:timing>
-    <p:tnLst>
-      <p:par>
-        <p:cTn id="1" dur="indefinite" restart="never" nodeType="tmRoot"/>
-      </p:par>
-    </p:tnLst>
-  </p:timing>
 </p:sld>
 </file>
 
@@ -15819,10 +15760,9 @@
           <a:lstStyle/>
           <a:p>
             <a:r>
-              <a:rPr lang="en-US" dirty="0" smtClean="0"/>
+              <a:rPr lang="en-US" dirty="0"/>
               <a:t>Two Basic Distributed Database Architectures</a:t>
             </a:r>
-            <a:endParaRPr lang="en-US" dirty="0"/>
           </a:p>
         </p:txBody>
       </p:sp>
@@ -15852,10 +15792,9 @@
               <a:buNone/>
             </a:pPr>
             <a:r>
-              <a:rPr lang="en-US" sz="2000" b="1" dirty="0" smtClean="0"/>
+              <a:rPr lang="en-US" sz="2000" b="1" dirty="0"/>
               <a:t>Design choices!!</a:t>
             </a:r>
-            <a:endParaRPr lang="en-US" sz="2000" b="1" dirty="0"/>
           </a:p>
         </p:txBody>
       </p:sp>
@@ -16005,10 +15944,9 @@
           <a:lstStyle/>
           <a:p>
             <a:r>
-              <a:rPr lang="en-US" dirty="0" smtClean="0"/>
+              <a:rPr lang="en-US" dirty="0"/>
               <a:t>Features</a:t>
             </a:r>
-            <a:endParaRPr lang="en-US" dirty="0"/>
           </a:p>
         </p:txBody>
       </p:sp>
@@ -16047,13 +15985,6 @@
   <p:clrMapOvr>
     <a:masterClrMapping/>
   </p:clrMapOvr>
-  <p:timing>
-    <p:tnLst>
-      <p:par>
-        <p:cTn id="1" dur="indefinite" restart="never" nodeType="tmRoot"/>
-      </p:par>
-    </p:tnLst>
-  </p:timing>
 </p:sld>
 </file>
 
@@ -16123,13 +16054,8 @@
             <a:pPr lvl="0"/>
             <a:r>
               <a:rPr lang="en-US" dirty="0"/>
-              <a:t>Peer to </a:t>
-            </a:r>
-            <a:r>
-              <a:rPr lang="en-US" dirty="0" smtClean="0"/>
-              <a:t>Peer Distributed Database</a:t>
-            </a:r>
-            <a:endParaRPr lang="en-US" dirty="0"/>
+              <a:t>Peer to Peer Distributed Database</a:t>
+            </a:r>
           </a:p>
         </p:txBody>
       </p:sp>
@@ -16160,15 +16086,7 @@
             </a:pPr>
             <a:r>
               <a:rPr lang="en-US" spc="10" dirty="0"/>
-              <a:t>A network of </a:t>
-            </a:r>
-            <a:r>
-              <a:rPr lang="en-US" spc="10" dirty="0" smtClean="0"/>
-              <a:t>computing </a:t>
-            </a:r>
-            <a:r>
-              <a:rPr lang="en-US" spc="10" dirty="0"/>
-              <a:t>“</a:t>
+              <a:t>A network of computing “</a:t>
             </a:r>
             <a:r>
               <a:rPr lang="en-US" b="1" spc="10" dirty="0"/>
@@ -16176,13 +16094,8 @@
             </a:r>
             <a:r>
               <a:rPr lang="en-US" spc="10" dirty="0"/>
-              <a:t>” make up the blockchain</a:t>
-            </a:r>
-            <a:r>
-              <a:rPr lang="en-US" spc="10" dirty="0" smtClean="0"/>
-              <a:t>.</a:t>
-            </a:r>
-            <a:endParaRPr lang="en-US" spc="10" dirty="0"/>
+              <a:t>” make up the blockchain.</a:t>
+            </a:r>
           </a:p>
           <a:p>
             <a:pPr marL="285750" indent="-285750">
@@ -16190,24 +16103,8 @@
               <a:buChar char="Ø"/>
             </a:pPr>
             <a:r>
-              <a:rPr lang="en-US" spc="10" dirty="0" smtClean="0"/>
-              <a:t>Computer </a:t>
-            </a:r>
-            <a:r>
               <a:rPr lang="en-US" spc="10" dirty="0"/>
-              <a:t>connected to the blockchain network using a client </a:t>
-            </a:r>
-            <a:r>
-              <a:rPr lang="en-US" spc="10" dirty="0" smtClean="0"/>
-              <a:t>gets </a:t>
-            </a:r>
-            <a:r>
-              <a:rPr lang="en-US" spc="10" dirty="0"/>
-              <a:t>a copy of the blockchain, which gets downloaded automatically upon joining the blockchain network</a:t>
-            </a:r>
-            <a:r>
-              <a:rPr lang="en-US" spc="10" dirty="0" smtClean="0"/>
-              <a:t>.</a:t>
+              <a:t>Computer connected to the blockchain network using a client gets a copy of the blockchain, which gets downloaded automatically upon joining the blockchain network.</a:t>
             </a:r>
           </a:p>
           <a:p>
@@ -16216,14 +16113,9 @@
               <a:buChar char="Ø"/>
             </a:pPr>
             <a:r>
-              <a:rPr lang="en-US" spc="10" dirty="0" smtClean="0"/>
-              <a:t>Every </a:t>
-            </a:r>
-            <a:r>
               <a:rPr lang="en-US" spc="10" dirty="0"/>
-              <a:t>node is an “administrator” of the blockchain, and joins the network voluntarily (in this sense, the network is decentralized). </a:t>
-            </a:r>
-            <a:endParaRPr lang="en-US" spc="10" dirty="0" smtClean="0"/>
+              <a:t>Every node is an “administrator” of the blockchain, and joins the network voluntarily (in this sense, the network is decentralized). </a:t>
+            </a:r>
           </a:p>
           <a:p>
             <a:pPr marL="285750" indent="-285750">
@@ -16231,16 +16123,8 @@
               <a:buChar char="Ø"/>
             </a:pPr>
             <a:r>
-              <a:rPr lang="en-US" spc="10" dirty="0" smtClean="0"/>
-              <a:t>Nodes perform the </a:t>
-            </a:r>
-            <a:r>
               <a:rPr lang="en-US" spc="10" dirty="0"/>
-              <a:t>task of validating and relaying </a:t>
-            </a:r>
-            <a:r>
-              <a:rPr lang="en-US" spc="10" dirty="0" smtClean="0"/>
-              <a:t>transactions</a:t>
+              <a:t>Nodes perform the task of validating and relaying transactions</a:t>
             </a:r>
           </a:p>
           <a:p>
@@ -16249,7 +16133,7 @@
               <a:buChar char="Ø"/>
             </a:pPr>
             <a:r>
-              <a:rPr lang="en-US" spc="10" dirty="0" smtClean="0"/>
+              <a:rPr lang="en-US" spc="10" dirty="0"/>
               <a:t>Incentive for participating? </a:t>
             </a:r>
           </a:p>
@@ -16259,20 +16143,8 @@
               <a:buChar char="§"/>
             </a:pPr>
             <a:r>
-              <a:rPr lang="en-US" spc="10" dirty="0" smtClean="0"/>
-              <a:t>the </a:t>
-            </a:r>
-            <a:r>
               <a:rPr lang="en-US" spc="10" dirty="0"/>
-              <a:t>chance of winning </a:t>
-            </a:r>
-            <a:r>
-              <a:rPr lang="en-US" spc="10" dirty="0" smtClean="0"/>
-              <a:t>Bitcoins</a:t>
-            </a:r>
-            <a:r>
-              <a:rPr lang="en-US" spc="10" dirty="0" smtClean="0"/>
-              <a:t>.</a:t>
+              <a:t>the chance of winning Bitcoins.</a:t>
             </a:r>
           </a:p>
           <a:p>
@@ -16281,10 +16153,9 @@
               <a:buChar char="§"/>
             </a:pPr>
             <a:r>
-              <a:rPr lang="en-US" spc="10" dirty="0" smtClean="0"/>
+              <a:rPr lang="en-US" spc="10" dirty="0"/>
               <a:t>Transaction Fees (minimal)</a:t>
             </a:r>
-            <a:endParaRPr lang="en-US" spc="10" dirty="0" smtClean="0"/>
           </a:p>
           <a:p>
             <a:pPr marL="742950" lvl="1" indent="-285750">
@@ -16292,12 +16163,8 @@
               <a:buChar char="§"/>
             </a:pPr>
             <a:r>
-              <a:rPr lang="en-US" spc="10" dirty="0" smtClean="0"/>
-              <a:t>Nodes </a:t>
-            </a:r>
-            <a:r>
               <a:rPr lang="en-US" spc="10" dirty="0"/>
-              <a:t>are said to be “</a:t>
+              <a:t>Nodes are said to be “</a:t>
             </a:r>
             <a:r>
               <a:rPr lang="en-US" b="1" spc="10" dirty="0"/>
@@ -16305,15 +16172,7 @@
             </a:r>
             <a:r>
               <a:rPr lang="en-US" spc="10" dirty="0"/>
-              <a:t>” </a:t>
-            </a:r>
-            <a:r>
-              <a:rPr lang="en-US" spc="10" dirty="0" smtClean="0"/>
-              <a:t>Bitcoin. In </a:t>
-            </a:r>
-            <a:r>
-              <a:rPr lang="en-US" spc="10" dirty="0"/>
-              <a:t>fact, each one is competing to win Bitcoins by solving computational puzzles.</a:t>
+              <a:t>” Bitcoin. In fact, each one is competing to win Bitcoins by solving computational puzzles.</a:t>
             </a:r>
           </a:p>
         </p:txBody>
@@ -16328,13 +16187,6 @@
   <p:clrMapOvr>
     <a:masterClrMapping/>
   </p:clrMapOvr>
-  <p:timing>
-    <p:tnLst>
-      <p:par>
-        <p:cTn id="1" dur="indefinite" restart="never" nodeType="tmRoot"/>
-      </p:par>
-    </p:tnLst>
-  </p:timing>
 </p:sld>
 </file>
 
@@ -16400,24 +16252,8 @@
               <a:buNone/>
             </a:pPr>
             <a:r>
-              <a:rPr lang="en-US" dirty="0" smtClean="0"/>
-              <a:t>A </a:t>
-            </a:r>
-            <a:r>
               <a:rPr lang="en-US" dirty="0"/>
-              <a:t>kind of self-auditing ecosystem of digital value, the network reconciles every transaction that happens in ten minute intervals. </a:t>
-            </a:r>
-            <a:r>
-              <a:rPr lang="en-US" dirty="0" smtClean="0"/>
-              <a:t>Two </a:t>
-            </a:r>
-            <a:r>
-              <a:rPr lang="en-US" dirty="0"/>
-              <a:t>important properties result from this</a:t>
-            </a:r>
-            <a:r>
-              <a:rPr lang="en-US" dirty="0" smtClean="0"/>
-              <a:t>:</a:t>
+              <a:t>A kind of self-auditing ecosystem of digital value, the network reconciles every transaction that happens in ten minute intervals. Two important properties result from this:</a:t>
             </a:r>
           </a:p>
           <a:p>
@@ -16435,24 +16271,12 @@
               <a:rPr lang="en-US" b="1" dirty="0"/>
               <a:t>Transparency</a:t>
             </a:r>
-            <a:r>
-              <a:rPr lang="en-US" dirty="0"/>
-              <a:t/>
-            </a:r>
             <a:br>
               <a:rPr lang="en-US" dirty="0"/>
             </a:br>
             <a:r>
-              <a:rPr lang="en-US" dirty="0" smtClean="0"/>
-              <a:t>Data </a:t>
-            </a:r>
-            <a:r>
               <a:rPr lang="en-US" dirty="0"/>
-              <a:t>is embedded within network as a whole, by definition it is public</a:t>
-            </a:r>
-            <a:r>
-              <a:rPr lang="en-US" dirty="0" smtClean="0"/>
-              <a:t>. Everyone knows about everyone else’s transactions.</a:t>
+              <a:t>Data is embedded within network as a whole, by definition it is public. Everyone knows about everyone else’s transactions.</a:t>
             </a:r>
           </a:p>
           <a:p>
@@ -16471,26 +16295,13 @@
               <a:rPr lang="en-US" b="1" dirty="0"/>
               <a:t>It cannot be corrupted</a:t>
             </a:r>
-            <a:r>
-              <a:rPr lang="en-US" dirty="0"/>
-              <a:t/>
-            </a:r>
             <a:br>
               <a:rPr lang="en-US" dirty="0"/>
             </a:br>
             <a:r>
-              <a:rPr lang="en-US" dirty="0" smtClean="0"/>
-              <a:t>Altering </a:t>
-            </a:r>
-            <a:r>
               <a:rPr lang="en-US" dirty="0"/>
-              <a:t>any unit of information on the blockchain would mean using a huge amount of computing power to override the entire network</a:t>
-            </a:r>
-            <a:r>
-              <a:rPr lang="en-US" dirty="0" smtClean="0"/>
-              <a:t>. Not impossible, but impractical!</a:t>
-            </a:r>
-            <a:endParaRPr lang="en-US" dirty="0"/>
+              <a:t>Altering any unit of information on the blockchain would mean using a huge amount of computing power to override the entire network. Not impossible, but impractical!</a:t>
+            </a:r>
           </a:p>
           <a:p>
             <a:endParaRPr lang="en-US" dirty="0"/>
@@ -16507,13 +16318,6 @@
   <p:clrMapOvr>
     <a:masterClrMapping/>
   </p:clrMapOvr>
-  <p:timing>
-    <p:tnLst>
-      <p:par>
-        <p:cTn id="1" dur="indefinite" restart="never" nodeType="tmRoot"/>
-      </p:par>
-    </p:tnLst>
-  </p:timing>
 </p:sld>
 </file>
 
@@ -16580,7 +16384,7 @@
               <a:buChar char="Ø"/>
             </a:pPr>
             <a:r>
-              <a:rPr lang="en-US" dirty="0" smtClean="0"/>
+              <a:rPr lang="en-US" dirty="0"/>
               <a:t>Deal with anonymous strangers, the system is designed using mathematical functions. And this aspects removes the need for trust.</a:t>
             </a:r>
           </a:p>
@@ -16590,12 +16394,8 @@
               <a:buChar char="Ø"/>
             </a:pPr>
             <a:r>
-              <a:rPr lang="en-US" dirty="0" smtClean="0"/>
-              <a:t>Blockchain </a:t>
-            </a:r>
-            <a:r>
               <a:rPr lang="en-US" dirty="0"/>
-              <a:t>security methods use encryption technology.</a:t>
+              <a:t>Blockchain security methods use encryption technology.</a:t>
             </a:r>
           </a:p>
           <a:p>
@@ -16607,7 +16407,6 @@
               <a:rPr lang="en-US" dirty="0"/>
               <a:t>The basis for this are the so-called public and private “keys”. A “public key” (a long, randomly-generated string of numbers) is a users’ address on the blockchain. Bitcoins sent across the network gets recorded as belonging to that address. The “private key” is like a password that gives its owner access to their Bitcoin or other digital assets. </a:t>
             </a:r>
-            <a:endParaRPr lang="en-US" dirty="0" smtClean="0"/>
           </a:p>
           <a:p>
             <a:pPr>
@@ -16616,15 +16415,7 @@
             </a:pPr>
             <a:r>
               <a:rPr lang="en-US" dirty="0"/>
-              <a:t>P</a:t>
-            </a:r>
-            <a:r>
-              <a:rPr lang="en-US" dirty="0" smtClean="0"/>
-              <a:t>rotecting </a:t>
-            </a:r>
-            <a:r>
-              <a:rPr lang="en-US" dirty="0"/>
-              <a:t>your digital assets will also require safeguarding of your private key by printing it out, creating what’s referred to as a paper wallet.</a:t>
+              <a:t>Protecting your digital assets will also require safeguarding of your private key by printing it out, creating what’s referred to as a paper wallet.</a:t>
             </a:r>
           </a:p>
           <a:p>
@@ -16646,13 +16437,6 @@
   <p:clrMapOvr>
     <a:masterClrMapping/>
   </p:clrMapOvr>
-  <p:timing>
-    <p:tnLst>
-      <p:par>
-        <p:cTn id="1" dur="indefinite" restart="never" nodeType="tmRoot"/>
-      </p:par>
-    </p:tnLst>
-  </p:timing>
 </p:sld>
 </file>
 
@@ -16689,10 +16473,9 @@
           <a:lstStyle/>
           <a:p>
             <a:r>
-              <a:rPr lang="en-US" dirty="0" smtClean="0"/>
+              <a:rPr lang="en-US" dirty="0"/>
               <a:t>Decentralized Consensus</a:t>
             </a:r>
-            <a:endParaRPr lang="en-US" dirty="0"/>
           </a:p>
         </p:txBody>
       </p:sp>
@@ -16991,7 +16774,7 @@
               <a:buFont typeface="Wingdings" panose="05000000000000000000" pitchFamily="2" charset="2"/>
               <a:buChar char="Ø"/>
             </a:pPr>
-            <a:endParaRPr lang="en-US" dirty="0" smtClean="0"/>
+            <a:endParaRPr lang="en-US" dirty="0"/>
           </a:p>
           <a:p>
             <a:pPr>
@@ -17006,7 +16789,7 @@
               <a:buChar char="Ø"/>
             </a:pPr>
             <a:r>
-              <a:rPr lang="en-US" dirty="0" smtClean="0"/>
+              <a:rPr lang="en-US" dirty="0"/>
               <a:t>With the absence of a central authority, it is crucial for all the nodes to be in consensus</a:t>
             </a:r>
           </a:p>
@@ -17016,7 +16799,7 @@
               <a:buChar char="Ø"/>
             </a:pPr>
             <a:r>
-              <a:rPr lang="en-US" dirty="0" smtClean="0"/>
+              <a:rPr lang="en-US" dirty="0"/>
               <a:t>If a transaction is validated by a majority of the nodes in the network, it is considered valid</a:t>
             </a:r>
           </a:p>
@@ -17032,13 +16815,6 @@
   <p:clrMapOvr>
     <a:masterClrMapping/>
   </p:clrMapOvr>
-  <p:timing>
-    <p:tnLst>
-      <p:par>
-        <p:cTn id="1" dur="indefinite" restart="never" nodeType="tmRoot"/>
-      </p:par>
-    </p:tnLst>
-  </p:timing>
 </p:sld>
 </file>
 
@@ -17110,13 +16886,6 @@
   <p:clrMapOvr>
     <a:masterClrMapping/>
   </p:clrMapOvr>
-  <p:timing>
-    <p:tnLst>
-      <p:par>
-        <p:cTn id="1" dur="indefinite" restart="never" nodeType="tmRoot"/>
-      </p:par>
-    </p:tnLst>
-  </p:timing>
 </p:sld>
 </file>
 
@@ -17153,10 +16922,9 @@
           <a:lstStyle/>
           <a:p>
             <a:r>
-              <a:rPr lang="en-US" dirty="0" smtClean="0"/>
+              <a:rPr lang="en-US" dirty="0"/>
               <a:t>Agenda</a:t>
             </a:r>
-            <a:endParaRPr lang="en-US" dirty="0"/>
           </a:p>
         </p:txBody>
       </p:sp>
@@ -17180,7 +16948,7 @@
               <a:buChar char="Ø"/>
             </a:pPr>
             <a:r>
-              <a:rPr lang="en-US" dirty="0" smtClean="0"/>
+              <a:rPr lang="en-US" dirty="0"/>
               <a:t>Introduction</a:t>
             </a:r>
           </a:p>
@@ -17224,7 +16992,7 @@
               <a:buChar char="Ø"/>
             </a:pPr>
             <a:r>
-              <a:rPr lang="en-US" dirty="0" smtClean="0"/>
+              <a:rPr lang="en-US" dirty="0"/>
               <a:t>Strengths/Weaknesses</a:t>
             </a:r>
           </a:p>
@@ -17234,10 +17002,9 @@
               <a:buChar char="Ø"/>
             </a:pPr>
             <a:r>
-              <a:rPr lang="en-US" dirty="0" smtClean="0"/>
+              <a:rPr lang="en-US" dirty="0"/>
               <a:t>Future scope</a:t>
             </a:r>
-            <a:endParaRPr lang="en-US" dirty="0"/>
           </a:p>
         </p:txBody>
       </p:sp>
@@ -17251,13 +17018,6 @@
   <p:clrMapOvr>
     <a:masterClrMapping/>
   </p:clrMapOvr>
-  <p:timing>
-    <p:tnLst>
-      <p:par>
-        <p:cTn id="1" dur="indefinite" restart="never" nodeType="tmRoot"/>
-      </p:par>
-    </p:tnLst>
-  </p:timing>
 </p:sld>
 </file>
 
@@ -17296,7 +17056,7 @@
             <a:pPr marL="0" indent="0">
               <a:buNone/>
             </a:pPr>
-            <a:endParaRPr lang="en-US" dirty="0" smtClean="0"/>
+            <a:endParaRPr lang="en-US" dirty="0"/>
           </a:p>
           <a:p>
             <a:pPr marL="0" indent="0">
@@ -17308,17 +17068,16 @@
             <a:pPr marL="0" indent="0">
               <a:buNone/>
             </a:pPr>
-            <a:endParaRPr lang="en-US" dirty="0" smtClean="0"/>
+            <a:endParaRPr lang="en-US" dirty="0"/>
           </a:p>
           <a:p>
             <a:pPr marL="0" indent="0">
               <a:buNone/>
             </a:pPr>
             <a:r>
-              <a:rPr lang="en-US" sz="2000" dirty="0" smtClean="0"/>
+              <a:rPr lang="en-US" sz="2000" dirty="0"/>
               <a:t>How can a random group of strangers manage each other’s financial transactions?</a:t>
             </a:r>
-            <a:endParaRPr lang="en-US" sz="2000" dirty="0"/>
           </a:p>
         </p:txBody>
       </p:sp>
@@ -17332,13 +17091,6 @@
   <p:clrMapOvr>
     <a:masterClrMapping/>
   </p:clrMapOvr>
-  <p:timing>
-    <p:tnLst>
-      <p:par>
-        <p:cTn id="1" dur="indefinite" restart="never" nodeType="tmRoot"/>
-      </p:par>
-    </p:tnLst>
-  </p:timing>
 </p:sld>
 </file>
 
@@ -17375,10 +17127,9 @@
           <a:lstStyle/>
           <a:p>
             <a:r>
-              <a:rPr lang="en-US" dirty="0" smtClean="0"/>
+              <a:rPr lang="en-US" dirty="0"/>
               <a:t>Sending</a:t>
             </a:r>
-            <a:endParaRPr lang="en-US" dirty="0"/>
           </a:p>
         </p:txBody>
       </p:sp>
@@ -17397,19 +17148,13 @@
           <a:bodyPr/>
           <a:lstStyle/>
           <a:p>
-            <a:endParaRPr lang="en-US" dirty="0" smtClean="0"/>
-          </a:p>
-          <a:p>
             <a:endParaRPr lang="en-US" dirty="0"/>
           </a:p>
           <a:p>
-            <a:endParaRPr lang="en-US" dirty="0" smtClean="0"/>
-          </a:p>
-          <a:p>
-            <a:pPr marL="0" indent="0">
-              <a:buNone/>
-            </a:pPr>
-            <a:endParaRPr lang="en-US" dirty="0" smtClean="0"/>
+            <a:endParaRPr lang="en-US" dirty="0"/>
+          </a:p>
+          <a:p>
+            <a:endParaRPr lang="en-US" dirty="0"/>
           </a:p>
           <a:p>
             <a:pPr marL="0" indent="0">
@@ -17421,11 +17166,16 @@
             <a:pPr marL="0" indent="0">
               <a:buNone/>
             </a:pPr>
-            <a:r>
-              <a:rPr lang="en-US" dirty="0" smtClean="0"/>
+            <a:endParaRPr lang="en-US" dirty="0"/>
+          </a:p>
+          <a:p>
+            <a:pPr marL="0" indent="0">
+              <a:buNone/>
+            </a:pPr>
+            <a:r>
+              <a:rPr lang="en-US" dirty="0"/>
               <a:t>Every node that receives this information, will update their copy of the ledger and pass along the information!</a:t>
             </a:r>
-            <a:endParaRPr lang="en-US" dirty="0"/>
           </a:p>
         </p:txBody>
       </p:sp>
@@ -17457,20 +17207,19 @@
           <a:lstStyle/>
           <a:p>
             <a:r>
-              <a:rPr lang="en-US" dirty="0" smtClean="0"/>
+              <a:rPr lang="en-US" dirty="0"/>
               <a:t>Alice </a:t>
             </a:r>
             <a:r>
-              <a:rPr lang="en-US" dirty="0" smtClean="0">
+              <a:rPr lang="en-US" dirty="0">
                 <a:sym typeface="Wingdings" panose="05000000000000000000" pitchFamily="2" charset="2"/>
               </a:rPr>
               <a:t></a:t>
             </a:r>
             <a:r>
-              <a:rPr lang="en-US" dirty="0" smtClean="0"/>
+              <a:rPr lang="en-US" dirty="0"/>
               <a:t> Bob      5.0 BTC</a:t>
             </a:r>
-            <a:endParaRPr lang="en-US" dirty="0"/>
           </a:p>
         </p:txBody>
       </p:sp>
@@ -17511,10 +17260,9 @@
           <a:p>
             <a:pPr algn="ctr"/>
             <a:r>
-              <a:rPr lang="en-US" dirty="0" smtClean="0"/>
+              <a:rPr lang="en-US" dirty="0"/>
               <a:t>Broadcast transaction to network</a:t>
             </a:r>
-            <a:endParaRPr lang="en-US" dirty="0"/>
           </a:p>
         </p:txBody>
       </p:sp>
@@ -17542,7 +17290,7 @@
           <a:p>
             <a:pPr algn="ctr"/>
             <a:r>
-              <a:rPr lang="en-US" dirty="0" smtClean="0">
+              <a:rPr lang="en-US" dirty="0">
                 <a:solidFill>
                   <a:srgbClr val="FF0000"/>
                 </a:solidFill>
@@ -17553,18 +17301,13 @@
           <a:p>
             <a:pPr algn="ctr"/>
             <a:r>
-              <a:rPr lang="en-US" dirty="0" smtClean="0">
+              <a:rPr lang="en-US" dirty="0">
                 <a:solidFill>
                   <a:srgbClr val="FF0000"/>
                 </a:solidFill>
               </a:rPr>
               <a:t>Alice should be Alice!</a:t>
             </a:r>
-            <a:endParaRPr lang="en-US" dirty="0">
-              <a:solidFill>
-                <a:srgbClr val="FF0000"/>
-              </a:solidFill>
-            </a:endParaRPr>
           </a:p>
         </p:txBody>
       </p:sp>
@@ -17692,10 +17435,9 @@
           <a:lstStyle/>
           <a:p>
             <a:r>
-              <a:rPr lang="en-US" dirty="0" smtClean="0"/>
+              <a:rPr lang="en-US" dirty="0"/>
               <a:t>Agenda</a:t>
             </a:r>
-            <a:endParaRPr lang="en-US" dirty="0"/>
           </a:p>
         </p:txBody>
       </p:sp>
@@ -17719,7 +17461,7 @@
               <a:buChar char="Ø"/>
             </a:pPr>
             <a:r>
-              <a:rPr lang="en-US" dirty="0" smtClean="0"/>
+              <a:rPr lang="en-US" dirty="0"/>
               <a:t>Introduction</a:t>
             </a:r>
           </a:p>
@@ -17729,7 +17471,7 @@
               <a:buChar char="Ø"/>
             </a:pPr>
             <a:r>
-              <a:rPr lang="en-US" dirty="0" smtClean="0"/>
+              <a:rPr lang="en-US" dirty="0"/>
               <a:t>Motivation</a:t>
             </a:r>
           </a:p>
@@ -17739,7 +17481,7 @@
               <a:buChar char="Ø"/>
             </a:pPr>
             <a:r>
-              <a:rPr lang="en-US" dirty="0" smtClean="0"/>
+              <a:rPr lang="en-US" dirty="0"/>
               <a:t>Technical Overview</a:t>
             </a:r>
           </a:p>
@@ -17749,7 +17491,7 @@
               <a:buChar char="Ø"/>
             </a:pPr>
             <a:r>
-              <a:rPr lang="en-US" dirty="0" smtClean="0"/>
+              <a:rPr lang="en-US" dirty="0"/>
               <a:t>How does it work?</a:t>
             </a:r>
           </a:p>
@@ -17759,7 +17501,7 @@
               <a:buChar char="Ø"/>
             </a:pPr>
             <a:r>
-              <a:rPr lang="en-US" dirty="0" smtClean="0"/>
+              <a:rPr lang="en-US" dirty="0"/>
               <a:t>Strengths/Weaknesses</a:t>
             </a:r>
           </a:p>
@@ -17769,10 +17511,9 @@
               <a:buChar char="Ø"/>
             </a:pPr>
             <a:r>
-              <a:rPr lang="en-US" dirty="0" smtClean="0"/>
+              <a:rPr lang="en-US" dirty="0"/>
               <a:t>Future scope</a:t>
             </a:r>
-            <a:endParaRPr lang="en-US" dirty="0"/>
           </a:p>
         </p:txBody>
       </p:sp>
@@ -17786,13 +17527,6 @@
   <p:clrMapOvr>
     <a:masterClrMapping/>
   </p:clrMapOvr>
-  <p:timing>
-    <p:tnLst>
-      <p:par>
-        <p:cTn id="1" dur="indefinite" restart="never" nodeType="tmRoot"/>
-      </p:par>
-    </p:tnLst>
-  </p:timing>
 </p:sld>
 </file>
 
@@ -17829,10 +17563,9 @@
           <a:lstStyle/>
           <a:p>
             <a:r>
-              <a:rPr lang="en-US" dirty="0" smtClean="0"/>
+              <a:rPr lang="en-US" dirty="0"/>
               <a:t>Authentication</a:t>
             </a:r>
-            <a:endParaRPr lang="en-US" dirty="0"/>
           </a:p>
         </p:txBody>
       </p:sp>
@@ -17860,14 +17593,14 @@
               <a:buFont typeface="Wingdings" panose="05000000000000000000" pitchFamily="2" charset="2"/>
               <a:buChar char="Ø"/>
             </a:pPr>
-            <a:endParaRPr lang="en-US" dirty="0" smtClean="0"/>
+            <a:endParaRPr lang="en-US" dirty="0"/>
           </a:p>
           <a:p>
             <a:pPr>
               <a:buFont typeface="Wingdings" panose="05000000000000000000" pitchFamily="2" charset="2"/>
               <a:buChar char="Ø"/>
             </a:pPr>
-            <a:endParaRPr lang="en-US" smtClean="0"/>
+            <a:endParaRPr lang="en-US"/>
           </a:p>
           <a:p>
             <a:pPr>
@@ -17875,11 +17608,11 @@
               <a:buChar char="Ø"/>
             </a:pPr>
             <a:r>
-              <a:rPr lang="en-US" smtClean="0"/>
+              <a:rPr lang="en-US"/>
               <a:t>Need </a:t>
             </a:r>
             <a:r>
-              <a:rPr lang="en-US" dirty="0" smtClean="0"/>
+              <a:rPr lang="en-US" dirty="0"/>
               <a:t>password to unlock and send funds</a:t>
             </a:r>
           </a:p>
@@ -17889,7 +17622,7 @@
               <a:buChar char="Ø"/>
             </a:pPr>
             <a:r>
-              <a:rPr lang="en-US" b="1" i="1" dirty="0" smtClean="0">
+              <a:rPr lang="en-US" b="1" i="1" dirty="0">
                 <a:solidFill>
                   <a:srgbClr val="0070C0"/>
                 </a:solidFill>
@@ -17903,7 +17636,7 @@
               <a:buChar char="Ø"/>
             </a:pPr>
             <a:r>
-              <a:rPr lang="en-US" dirty="0" smtClean="0"/>
+              <a:rPr lang="en-US" dirty="0"/>
               <a:t>Digital Signatures created by using sender’s private key and transaction, and thus every transaction has a different signature</a:t>
             </a:r>
           </a:p>
@@ -17913,10 +17646,9 @@
               <a:buChar char="Ø"/>
             </a:pPr>
             <a:r>
-              <a:rPr lang="en-US" dirty="0" smtClean="0"/>
+              <a:rPr lang="en-US" dirty="0"/>
               <a:t>This also prevents any modification of messages in the network. Because, if the message is modified, the digital signature will become invalid.</a:t>
             </a:r>
-            <a:endParaRPr lang="en-US" dirty="0"/>
           </a:p>
         </p:txBody>
       </p:sp>
@@ -17954,13 +17686,6 @@
   <p:clrMapOvr>
     <a:masterClrMapping/>
   </p:clrMapOvr>
-  <p:timing>
-    <p:tnLst>
-      <p:par>
-        <p:cTn id="1" dur="indefinite" restart="never" nodeType="tmRoot"/>
-      </p:par>
-    </p:tnLst>
-  </p:timing>
 </p:sld>
 </file>
 
@@ -17997,10 +17722,9 @@
           <a:lstStyle/>
           <a:p>
             <a:r>
-              <a:rPr lang="en-US" dirty="0" smtClean="0"/>
+              <a:rPr lang="en-US" dirty="0"/>
               <a:t>Digital Signatures</a:t>
             </a:r>
-            <a:endParaRPr lang="en-US" dirty="0"/>
           </a:p>
         </p:txBody>
       </p:sp>
@@ -18053,7 +17777,7 @@
           <a:lstStyle/>
           <a:p>
             <a:r>
-              <a:rPr lang="en-US" sz="1600" dirty="0" smtClean="0">
+              <a:rPr lang="en-US" sz="1600" dirty="0">
                 <a:solidFill>
                   <a:schemeClr val="accent3">
                     <a:lumMod val="75000"/>
@@ -18065,7 +17789,7 @@
           </a:p>
           <a:p>
             <a:r>
-              <a:rPr lang="en-US" sz="1600" dirty="0" smtClean="0">
+              <a:rPr lang="en-US" sz="1600" dirty="0">
                 <a:solidFill>
                   <a:schemeClr val="accent3">
                     <a:lumMod val="75000"/>
@@ -18074,13 +17798,6 @@
               </a:rPr>
               <a:t>True password.</a:t>
             </a:r>
-            <a:endParaRPr lang="en-US" sz="1600" dirty="0">
-              <a:solidFill>
-                <a:schemeClr val="accent3">
-                  <a:lumMod val="75000"/>
-                </a:schemeClr>
-              </a:solidFill>
-            </a:endParaRPr>
           </a:p>
         </p:txBody>
       </p:sp>
@@ -18107,7 +17824,7 @@
           <a:lstStyle/>
           <a:p>
             <a:r>
-              <a:rPr lang="en-US" sz="1600" dirty="0" smtClean="0">
+              <a:rPr lang="en-US" sz="1600" dirty="0">
                 <a:solidFill>
                   <a:schemeClr val="accent3">
                     <a:lumMod val="75000"/>
@@ -18116,13 +17833,6 @@
               </a:rPr>
               <a:t>Verifiers use public key to authenticate.</a:t>
             </a:r>
-            <a:endParaRPr lang="en-US" sz="1600" dirty="0">
-              <a:solidFill>
-                <a:schemeClr val="accent3">
-                  <a:lumMod val="75000"/>
-                </a:schemeClr>
-              </a:solidFill>
-            </a:endParaRPr>
           </a:p>
         </p:txBody>
       </p:sp>
@@ -18149,7 +17859,7 @@
           <a:lstStyle/>
           <a:p>
             <a:r>
-              <a:rPr lang="en-US" sz="1600" dirty="0" smtClean="0">
+              <a:rPr lang="en-US" sz="1600" dirty="0">
                 <a:solidFill>
                   <a:schemeClr val="accent3">
                     <a:lumMod val="75000"/>
@@ -18158,13 +17868,6 @@
               </a:rPr>
               <a:t>Intermediary that proves the sender has a password without revealing the actual password</a:t>
             </a:r>
-            <a:endParaRPr lang="en-US" sz="1600" dirty="0">
-              <a:solidFill>
-                <a:schemeClr val="accent3">
-                  <a:lumMod val="75000"/>
-                </a:schemeClr>
-              </a:solidFill>
-            </a:endParaRPr>
           </a:p>
         </p:txBody>
       </p:sp>
@@ -18295,13 +17998,6 @@
   <p:clrMapOvr>
     <a:masterClrMapping/>
   </p:clrMapOvr>
-  <p:timing>
-    <p:tnLst>
-      <p:par>
-        <p:cTn id="1" dur="indefinite" restart="never" nodeType="tmRoot"/>
-      </p:par>
-    </p:tnLst>
-  </p:timing>
 </p:sld>
 </file>
 
@@ -18345,7 +18041,7 @@
             <a:pPr marL="0" indent="0">
               <a:buNone/>
             </a:pPr>
-            <a:endParaRPr lang="en-US" dirty="0" smtClean="0"/>
+            <a:endParaRPr lang="en-US" dirty="0"/>
           </a:p>
           <a:p>
             <a:pPr marL="0" indent="0">
@@ -18357,17 +18053,16 @@
             <a:pPr marL="0" indent="0">
               <a:buNone/>
             </a:pPr>
-            <a:endParaRPr lang="en-US" dirty="0" smtClean="0"/>
+            <a:endParaRPr lang="en-US" dirty="0"/>
           </a:p>
           <a:p>
             <a:pPr marL="0" indent="0">
               <a:buNone/>
             </a:pPr>
             <a:r>
-              <a:rPr lang="en-US" sz="2000" dirty="0" smtClean="0"/>
+              <a:rPr lang="en-US" sz="2000" dirty="0"/>
               <a:t>How do you know how much account balance a user has?</a:t>
             </a:r>
-            <a:endParaRPr lang="en-US" sz="2000" dirty="0"/>
           </a:p>
         </p:txBody>
       </p:sp>
@@ -18381,13 +18076,6 @@
   <p:clrMapOvr>
     <a:masterClrMapping/>
   </p:clrMapOvr>
-  <p:timing>
-    <p:tnLst>
-      <p:par>
-        <p:cTn id="1" dur="indefinite" restart="never" nodeType="tmRoot"/>
-      </p:par>
-    </p:tnLst>
-  </p:timing>
 </p:sld>
 </file>
 
@@ -18424,10 +18112,9 @@
           <a:lstStyle/>
           <a:p>
             <a:r>
-              <a:rPr lang="en-US" dirty="0" smtClean="0"/>
+              <a:rPr lang="en-US" dirty="0"/>
               <a:t>Account Balances?</a:t>
             </a:r>
-            <a:endParaRPr lang="en-US" dirty="0"/>
           </a:p>
         </p:txBody>
       </p:sp>
@@ -18530,7 +18217,7 @@
           <a:lstStyle/>
           <a:p>
             <a:r>
-              <a:rPr lang="en-US" dirty="0" smtClean="0"/>
+              <a:rPr lang="en-US" dirty="0"/>
               <a:t>Ledgers store only transactions!!</a:t>
             </a:r>
           </a:p>
@@ -18539,7 +18226,7 @@
           </a:p>
           <a:p>
             <a:r>
-              <a:rPr lang="en-US" dirty="0" smtClean="0"/>
+              <a:rPr lang="en-US" dirty="0"/>
               <a:t>Ownership of funds are verified using links to previous transactions!!</a:t>
             </a:r>
           </a:p>
@@ -18735,13 +18422,6 @@
   <p:clrMapOvr>
     <a:masterClrMapping/>
   </p:clrMapOvr>
-  <p:timing>
-    <p:tnLst>
-      <p:par>
-        <p:cTn id="1" dur="indefinite" restart="never" nodeType="tmRoot"/>
-      </p:par>
-    </p:tnLst>
-  </p:timing>
 </p:sld>
 </file>
 
@@ -18834,13 +18514,6 @@
   <p:clrMapOvr>
     <a:masterClrMapping/>
   </p:clrMapOvr>
-  <p:timing>
-    <p:tnLst>
-      <p:par>
-        <p:cTn id="1" dur="indefinite" restart="never" nodeType="tmRoot"/>
-      </p:par>
-    </p:tnLst>
-  </p:timing>
 </p:sld>
 </file>
 
@@ -18912,7 +18585,7 @@
               <a:buChar char="Ø"/>
             </a:pPr>
             <a:r>
-              <a:rPr lang="en-US" dirty="0" smtClean="0"/>
+              <a:rPr lang="en-US" dirty="0"/>
               <a:t>Validity of  each transaction depends on the validity of previous one!</a:t>
             </a:r>
           </a:p>
@@ -18923,21 +18596,16 @@
             </a:pPr>
             <a:r>
               <a:rPr lang="en-US" dirty="0"/>
-              <a:t>The first time you install a Bitcoin Wallet Software, it downloads any transaction ever made and it checks each one’s validity all the way back to the very first transaction</a:t>
-            </a:r>
-            <a:r>
-              <a:rPr lang="en-US" dirty="0" smtClean="0"/>
-              <a:t>! (Can take </a:t>
-            </a:r>
-            <a:r>
-              <a:rPr lang="en-US" dirty="0" err="1" smtClean="0"/>
-              <a:t>upto</a:t>
-            </a:r>
-            <a:r>
-              <a:rPr lang="en-US" dirty="0" smtClean="0"/>
-              <a:t> 24 hours, but only needs to be done once!)</a:t>
-            </a:r>
-            <a:endParaRPr lang="en-US" dirty="0"/>
+              <a:t>The first time you install a Bitcoin Wallet Software, it downloads any transaction ever made and it checks each one’s validity all the way back to the very first transaction! (Can </a:t>
+            </a:r>
+            <a:r>
+              <a:rPr lang="en-US"/>
+              <a:t>take up to </a:t>
+            </a:r>
+            <a:r>
+              <a:rPr lang="en-US" dirty="0"/>
+              <a:t>24 hours, but only needs to be done once!)</a:t>
+            </a:r>
           </a:p>
         </p:txBody>
       </p:sp>
@@ -18951,13 +18619,6 @@
   <p:clrMapOvr>
     <a:masterClrMapping/>
   </p:clrMapOvr>
-  <p:timing>
-    <p:tnLst>
-      <p:par>
-        <p:cTn id="1" dur="indefinite" restart="never" nodeType="tmRoot"/>
-      </p:par>
-    </p:tnLst>
-  </p:timing>
 </p:sld>
 </file>
 
@@ -18994,10 +18655,9 @@
           <a:lstStyle/>
           <a:p>
             <a:r>
-              <a:rPr lang="en-US" dirty="0" smtClean="0"/>
+              <a:rPr lang="en-US" dirty="0"/>
               <a:t>Transaction Verification</a:t>
             </a:r>
-            <a:endParaRPr lang="en-US" dirty="0"/>
           </a:p>
         </p:txBody>
       </p:sp>
@@ -19058,7 +18718,7 @@
           <a:lstStyle/>
           <a:p>
             <a:r>
-              <a:rPr lang="en-US" b="1" i="1" dirty="0" smtClean="0">
+              <a:rPr lang="en-US" b="1" i="1" dirty="0">
                 <a:solidFill>
                   <a:schemeClr val="accent3">
                     <a:lumMod val="75000"/>
@@ -19073,7 +18733,7 @@
               <a:buAutoNum type="arabicPeriod"/>
             </a:pPr>
             <a:r>
-              <a:rPr lang="en-US" b="1" i="1" dirty="0" smtClean="0">
+              <a:rPr lang="en-US" b="1" i="1" dirty="0">
                 <a:solidFill>
                   <a:schemeClr val="accent3">
                     <a:lumMod val="75000"/>
@@ -19088,7 +18748,7 @@
               <a:buAutoNum type="arabicPeriod"/>
             </a:pPr>
             <a:r>
-              <a:rPr lang="en-US" b="1" i="1" dirty="0" smtClean="0">
+              <a:rPr lang="en-US" b="1" i="1" dirty="0">
                 <a:solidFill>
                   <a:schemeClr val="accent3">
                     <a:lumMod val="75000"/>
@@ -19103,7 +18763,7 @@
               <a:buAutoNum type="arabicPeriod"/>
             </a:pPr>
             <a:r>
-              <a:rPr lang="en-US" b="1" i="1" dirty="0" smtClean="0">
+              <a:rPr lang="en-US" b="1" i="1" dirty="0">
                 <a:solidFill>
                   <a:schemeClr val="accent3">
                     <a:lumMod val="75000"/>
@@ -19112,13 +18772,6 @@
               </a:rPr>
               <a:t>Inputs unspent</a:t>
             </a:r>
-            <a:endParaRPr lang="en-US" b="1" i="1" dirty="0">
-              <a:solidFill>
-                <a:schemeClr val="accent3">
-                  <a:lumMod val="75000"/>
-                </a:schemeClr>
-              </a:solidFill>
-            </a:endParaRPr>
           </a:p>
         </p:txBody>
       </p:sp>
@@ -19172,13 +18825,6 @@
   <p:clrMapOvr>
     <a:masterClrMapping/>
   </p:clrMapOvr>
-  <p:timing>
-    <p:tnLst>
-      <p:par>
-        <p:cTn id="1" dur="indefinite" restart="never" nodeType="tmRoot"/>
-      </p:par>
-    </p:tnLst>
-  </p:timing>
 </p:sld>
 </file>
 
@@ -19215,10 +18861,9 @@
           <a:lstStyle/>
           <a:p>
             <a:r>
-              <a:rPr lang="en-US" dirty="0" smtClean="0"/>
+              <a:rPr lang="en-US" dirty="0"/>
               <a:t>Security Hole: Transaction Ordering</a:t>
             </a:r>
-            <a:endParaRPr lang="en-US" dirty="0"/>
           </a:p>
         </p:txBody>
       </p:sp>
@@ -19260,20 +18905,12 @@
           <a:p>
             <a:pPr algn="ctr"/>
             <a:r>
-              <a:rPr lang="en-US" dirty="0" smtClean="0">
-                <a:solidFill>
-                  <a:schemeClr val="tx1"/>
-                </a:solidFill>
-              </a:rPr>
-              <a:t>Order </a:t>
-            </a:r>
-            <a:r>
               <a:rPr lang="en-US" dirty="0">
                 <a:solidFill>
                   <a:schemeClr val="tx1"/>
                 </a:solidFill>
               </a:rPr>
-              <a:t>in which transactions arrive at a node </a:t>
+              <a:t>Order in which transactions arrive at a node </a:t>
             </a:r>
           </a:p>
         </p:txBody>
@@ -19316,20 +18953,12 @@
           <a:p>
             <a:pPr algn="ctr"/>
             <a:r>
-              <a:rPr lang="en-US" dirty="0" smtClean="0">
-                <a:solidFill>
-                  <a:schemeClr val="tx1"/>
-                </a:solidFill>
-              </a:rPr>
-              <a:t>Order </a:t>
-            </a:r>
-            <a:r>
               <a:rPr lang="en-US" dirty="0">
                 <a:solidFill>
                   <a:schemeClr val="tx1"/>
                 </a:solidFill>
               </a:rPr>
-              <a:t>in which transactions were created</a:t>
+              <a:t>Order in which transactions were created</a:t>
             </a:r>
           </a:p>
         </p:txBody>
@@ -19416,18 +19045,13 @@
           <a:p>
             <a:pPr algn="ctr"/>
             <a:r>
-              <a:rPr lang="en-US" dirty="0" smtClean="0">
+              <a:rPr lang="en-US" dirty="0">
                 <a:solidFill>
                   <a:schemeClr val="tx1"/>
                 </a:solidFill>
               </a:rPr>
               <a:t>1.</a:t>
             </a:r>
-            <a:endParaRPr lang="en-US" dirty="0">
-              <a:solidFill>
-                <a:schemeClr val="tx1"/>
-              </a:solidFill>
-            </a:endParaRPr>
           </a:p>
         </p:txBody>
       </p:sp>
@@ -19474,21 +19098,8 @@
                   <a:schemeClr val="tx1"/>
                 </a:solidFill>
               </a:rPr>
-              <a:t>2</a:t>
-            </a:r>
-            <a:r>
-              <a:rPr lang="en-US" dirty="0" smtClean="0">
-                <a:solidFill>
-                  <a:schemeClr val="tx1"/>
-                </a:solidFill>
-              </a:rPr>
-              <a:t>.</a:t>
-            </a:r>
-            <a:endParaRPr lang="en-US" dirty="0">
-              <a:solidFill>
-                <a:schemeClr val="tx1"/>
-              </a:solidFill>
-            </a:endParaRPr>
+              <a:t>2.</a:t>
+            </a:r>
           </a:p>
         </p:txBody>
       </p:sp>
@@ -19624,18 +19235,13 @@
           <a:p>
             <a:pPr algn="ctr"/>
             <a:r>
-              <a:rPr lang="en-US" dirty="0" smtClean="0">
+              <a:rPr lang="en-US" dirty="0">
                 <a:solidFill>
                   <a:srgbClr val="FF0000"/>
                 </a:solidFill>
               </a:rPr>
               <a:t>Double Spending Fraud</a:t>
             </a:r>
-            <a:endParaRPr lang="en-US" dirty="0">
-              <a:solidFill>
-                <a:srgbClr val="FF0000"/>
-              </a:solidFill>
-            </a:endParaRPr>
           </a:p>
         </p:txBody>
       </p:sp>
@@ -19815,10 +19421,9 @@
           <a:lstStyle/>
           <a:p>
             <a:r>
-              <a:rPr lang="en-US" dirty="0" smtClean="0"/>
+              <a:rPr lang="en-US" dirty="0"/>
               <a:t>Double Spending Fraud</a:t>
             </a:r>
-            <a:endParaRPr lang="en-US" dirty="0"/>
           </a:p>
         </p:txBody>
       </p:sp>
@@ -19879,7 +19484,7 @@
           <a:lstStyle/>
           <a:p>
             <a:r>
-              <a:rPr lang="en-US" i="1" dirty="0" smtClean="0"/>
+              <a:rPr lang="en-US" i="1" dirty="0"/>
               <a:t>If the second transaction is received first, (by when if Bob would have already shipped the product) then first transaction would be invalidated.</a:t>
             </a:r>
           </a:p>
@@ -19888,10 +19493,9 @@
           </a:p>
           <a:p>
             <a:r>
-              <a:rPr lang="en-US" i="1" dirty="0" smtClean="0"/>
+              <a:rPr lang="en-US" i="1" dirty="0"/>
               <a:t>Bob would be out of the product as well as would not receive the payment</a:t>
             </a:r>
-            <a:endParaRPr lang="en-US" i="1" dirty="0"/>
           </a:p>
         </p:txBody>
       </p:sp>
@@ -20046,10 +19650,9 @@
           <a:lstStyle/>
           <a:p>
             <a:r>
-              <a:rPr lang="en-US" dirty="0" smtClean="0"/>
+              <a:rPr lang="en-US" dirty="0"/>
               <a:t>Agenda</a:t>
             </a:r>
-            <a:endParaRPr lang="en-US" dirty="0"/>
           </a:p>
         </p:txBody>
       </p:sp>
@@ -20073,7 +19676,7 @@
               <a:buChar char="Ø"/>
             </a:pPr>
             <a:r>
-              <a:rPr lang="en-US" dirty="0" smtClean="0">
+              <a:rPr lang="en-US" dirty="0">
                 <a:solidFill>
                   <a:srgbClr val="FF0000"/>
                 </a:solidFill>
@@ -20087,7 +19690,7 @@
               <a:buChar char="Ø"/>
             </a:pPr>
             <a:r>
-              <a:rPr lang="en-US" dirty="0" smtClean="0"/>
+              <a:rPr lang="en-US" dirty="0"/>
               <a:t>Motivation</a:t>
             </a:r>
           </a:p>
@@ -20097,7 +19700,7 @@
               <a:buChar char="Ø"/>
             </a:pPr>
             <a:r>
-              <a:rPr lang="en-US" dirty="0" smtClean="0"/>
+              <a:rPr lang="en-US" dirty="0"/>
               <a:t>Technical Overview</a:t>
             </a:r>
           </a:p>
@@ -20117,7 +19720,7 @@
               <a:buChar char="Ø"/>
             </a:pPr>
             <a:r>
-              <a:rPr lang="en-US" dirty="0" smtClean="0"/>
+              <a:rPr lang="en-US" dirty="0"/>
               <a:t>Strengths/Weaknesses</a:t>
             </a:r>
           </a:p>
@@ -20127,10 +19730,9 @@
               <a:buChar char="Ø"/>
             </a:pPr>
             <a:r>
-              <a:rPr lang="en-US" dirty="0" smtClean="0"/>
+              <a:rPr lang="en-US" dirty="0"/>
               <a:t>Future scope</a:t>
             </a:r>
-            <a:endParaRPr lang="en-US" dirty="0"/>
           </a:p>
         </p:txBody>
       </p:sp>
@@ -20144,13 +19746,6 @@
   <p:clrMapOvr>
     <a:masterClrMapping/>
   </p:clrMapOvr>
-  <p:timing>
-    <p:tnLst>
-      <p:par>
-        <p:cTn id="1" dur="indefinite" restart="never" nodeType="tmRoot"/>
-      </p:par>
-    </p:tnLst>
-  </p:timing>
 </p:sld>
 </file>
 
@@ -20194,7 +19789,7 @@
             <a:pPr marL="0" indent="0">
               <a:buNone/>
             </a:pPr>
-            <a:endParaRPr lang="en-US" dirty="0" smtClean="0"/>
+            <a:endParaRPr lang="en-US" dirty="0"/>
           </a:p>
           <a:p>
             <a:pPr marL="0" indent="0">
@@ -20206,17 +19801,16 @@
             <a:pPr marL="0" indent="0">
               <a:buNone/>
             </a:pPr>
-            <a:endParaRPr lang="en-US" dirty="0" smtClean="0"/>
+            <a:endParaRPr lang="en-US" dirty="0"/>
           </a:p>
           <a:p>
             <a:pPr marL="0" indent="0">
               <a:buNone/>
             </a:pPr>
             <a:r>
-              <a:rPr lang="en-US" sz="2800" b="1" dirty="0" smtClean="0"/>
+              <a:rPr lang="en-US" sz="2800" b="1" dirty="0"/>
               <a:t>Nodes need to agree on transaction order!</a:t>
             </a:r>
-            <a:endParaRPr lang="en-US" sz="2800" b="1" dirty="0"/>
           </a:p>
         </p:txBody>
       </p:sp>
@@ -20230,13 +19824,6 @@
   <p:clrMapOvr>
     <a:masterClrMapping/>
   </p:clrMapOvr>
-  <p:timing>
-    <p:tnLst>
-      <p:par>
-        <p:cTn id="1" dur="indefinite" restart="never" nodeType="tmRoot"/>
-      </p:par>
-    </p:tnLst>
-  </p:timing>
 </p:sld>
 </file>
 
@@ -20273,10 +19860,9 @@
           <a:lstStyle/>
           <a:p>
             <a:r>
-              <a:rPr lang="en-US" dirty="0" smtClean="0"/>
+              <a:rPr lang="en-US" dirty="0"/>
               <a:t>Ordering Solution</a:t>
             </a:r>
-            <a:endParaRPr lang="en-US" dirty="0"/>
           </a:p>
         </p:txBody>
       </p:sp>
@@ -20312,7 +19898,7 @@
               <a:buChar char="Ø"/>
             </a:pPr>
             <a:r>
-              <a:rPr lang="en-US" dirty="0" smtClean="0"/>
+              <a:rPr lang="en-US" dirty="0"/>
               <a:t>Transaction are grouped together as blocks!</a:t>
             </a:r>
           </a:p>
@@ -20322,7 +19908,7 @@
               <a:buChar char="§"/>
             </a:pPr>
             <a:r>
-              <a:rPr lang="en-US" dirty="0" smtClean="0"/>
+              <a:rPr lang="en-US" dirty="0"/>
               <a:t>Transactions in the same block are considered to have happened at the same time</a:t>
             </a:r>
           </a:p>
@@ -20332,7 +19918,7 @@
               <a:buChar char="Ø"/>
             </a:pPr>
             <a:r>
-              <a:rPr lang="en-US" dirty="0" smtClean="0"/>
+              <a:rPr lang="en-US" dirty="0"/>
               <a:t>Each block also has a reference to the previous block. </a:t>
             </a:r>
           </a:p>
@@ -20342,7 +19928,7 @@
               <a:buChar char="§"/>
             </a:pPr>
             <a:r>
-              <a:rPr lang="en-US" dirty="0" smtClean="0"/>
+              <a:rPr lang="en-US" dirty="0"/>
               <a:t>This is how order is maintained historically</a:t>
             </a:r>
           </a:p>
@@ -20409,13 +19995,6 @@
   <p:clrMapOvr>
     <a:masterClrMapping/>
   </p:clrMapOvr>
-  <p:timing>
-    <p:tnLst>
-      <p:par>
-        <p:cTn id="1" dur="indefinite" restart="never" nodeType="tmRoot"/>
-      </p:par>
-    </p:tnLst>
-  </p:timing>
 </p:sld>
 </file>
 
@@ -20452,10 +20031,9 @@
           <a:lstStyle/>
           <a:p>
             <a:r>
-              <a:rPr lang="en-US" dirty="0" smtClean="0"/>
+              <a:rPr lang="en-US" dirty="0"/>
               <a:t>Block Creation (1/2)</a:t>
             </a:r>
-            <a:endParaRPr lang="en-US" dirty="0"/>
           </a:p>
         </p:txBody>
       </p:sp>
@@ -20518,10 +20096,9 @@
           <a:lstStyle/>
           <a:p>
             <a:r>
-              <a:rPr lang="en-US" i="1" dirty="0" smtClean="0"/>
+              <a:rPr lang="en-US" i="1" dirty="0"/>
               <a:t>Any node can collect a set of unconfirmed transactions into a block and broadcast it to the network as a suggestion for what the next block in the chain could be.</a:t>
             </a:r>
-            <a:endParaRPr lang="en-US" i="1" dirty="0"/>
           </a:p>
         </p:txBody>
       </p:sp>
@@ -20535,13 +20112,6 @@
   <p:clrMapOvr>
     <a:masterClrMapping/>
   </p:clrMapOvr>
-  <p:timing>
-    <p:tnLst>
-      <p:par>
-        <p:cTn id="1" dur="indefinite" restart="never" nodeType="tmRoot"/>
-      </p:par>
-    </p:tnLst>
-  </p:timing>
 </p:sld>
 </file>
 
@@ -20578,10 +20148,9 @@
           <a:lstStyle/>
           <a:p>
             <a:r>
-              <a:rPr lang="en-US" dirty="0" smtClean="0"/>
+              <a:rPr lang="en-US" dirty="0"/>
               <a:t>Block Creation (2/2)</a:t>
             </a:r>
-            <a:endParaRPr lang="en-US" dirty="0"/>
           </a:p>
         </p:txBody>
       </p:sp>
@@ -20613,7 +20182,7 @@
           <a:lstStyle/>
           <a:p>
             <a:r>
-              <a:rPr lang="en-US" i="1" dirty="0" smtClean="0"/>
+              <a:rPr lang="en-US" i="1" dirty="0"/>
               <a:t>How to decide which one of the potential next blocks to chose from?</a:t>
             </a:r>
           </a:p>
@@ -20622,10 +20191,9 @@
           </a:p>
           <a:p>
             <a:r>
-              <a:rPr lang="en-US" i="1" dirty="0" smtClean="0"/>
+              <a:rPr lang="en-US" i="1" dirty="0"/>
               <a:t>Cannot rely on the order in which the blocks arrive.</a:t>
             </a:r>
-            <a:endParaRPr lang="en-US" i="1" dirty="0"/>
           </a:p>
         </p:txBody>
       </p:sp>
@@ -20782,10 +20350,9 @@
           <a:lstStyle/>
           <a:p>
             <a:r>
-              <a:rPr lang="en-US" dirty="0" smtClean="0"/>
+              <a:rPr lang="en-US" dirty="0"/>
               <a:t>Block Puzzle</a:t>
             </a:r>
-            <a:endParaRPr lang="en-US" dirty="0"/>
           </a:p>
         </p:txBody>
       </p:sp>
@@ -20812,25 +20379,25 @@
             <a:endParaRPr lang="en-US" dirty="0"/>
           </a:p>
           <a:p>
-            <a:endParaRPr lang="en-US" dirty="0" smtClean="0"/>
-          </a:p>
-          <a:p>
             <a:endParaRPr lang="en-US" dirty="0"/>
           </a:p>
           <a:p>
-            <a:endParaRPr lang="en-US" dirty="0" smtClean="0"/>
-          </a:p>
-          <a:p>
             <a:endParaRPr lang="en-US" dirty="0"/>
           </a:p>
           <a:p>
-            <a:endParaRPr lang="en-US" dirty="0" smtClean="0"/>
-          </a:p>
-          <a:p>
             <a:endParaRPr lang="en-US" dirty="0"/>
           </a:p>
           <a:p>
-            <a:endParaRPr lang="en-US" dirty="0" smtClean="0"/>
+            <a:endParaRPr lang="en-US" dirty="0"/>
+          </a:p>
+          <a:p>
+            <a:endParaRPr lang="en-US" dirty="0"/>
+          </a:p>
+          <a:p>
+            <a:endParaRPr lang="en-US" dirty="0"/>
+          </a:p>
+          <a:p>
+            <a:endParaRPr lang="en-US" dirty="0"/>
           </a:p>
         </p:txBody>
       </p:sp>
@@ -20891,7 +20458,7 @@
           <a:lstStyle/>
           <a:p>
             <a:r>
-              <a:rPr lang="en-US" dirty="0" smtClean="0"/>
+              <a:rPr lang="en-US" dirty="0"/>
               <a:t>Each valid block must contain answer to a very special mathematical problem.</a:t>
             </a:r>
           </a:p>
@@ -20900,10 +20467,9 @@
           </a:p>
           <a:p>
             <a:r>
-              <a:rPr lang="en-US" dirty="0" smtClean="0"/>
+              <a:rPr lang="en-US" dirty="0"/>
               <a:t>Computers run the entire text of a block plus an additional random guess through something called a “Cryptographic Hash” until the output is below a certain value!</a:t>
             </a:r>
-            <a:endParaRPr lang="en-US" dirty="0"/>
           </a:p>
         </p:txBody>
       </p:sp>
@@ -20917,13 +20483,6 @@
   <p:clrMapOvr>
     <a:masterClrMapping/>
   </p:clrMapOvr>
-  <p:timing>
-    <p:tnLst>
-      <p:par>
-        <p:cTn id="1" dur="indefinite" restart="never" nodeType="tmRoot"/>
-      </p:par>
-    </p:tnLst>
-  </p:timing>
 </p:sld>
 </file>
 
@@ -20960,10 +20519,9 @@
           <a:lstStyle/>
           <a:p>
             <a:r>
-              <a:rPr lang="en-US" dirty="0" smtClean="0"/>
+              <a:rPr lang="en-US" dirty="0"/>
               <a:t>Cryptographic Hash</a:t>
             </a:r>
-            <a:endParaRPr lang="en-US" dirty="0"/>
           </a:p>
         </p:txBody>
       </p:sp>
@@ -20991,11 +20549,11 @@
               <a:buNone/>
             </a:pPr>
             <a:r>
-              <a:rPr lang="en-US" dirty="0" smtClean="0"/>
+              <a:rPr lang="en-US" dirty="0"/>
               <a:t>Text </a:t>
             </a:r>
             <a:r>
-              <a:rPr lang="en-US" dirty="0" smtClean="0">
+              <a:rPr lang="en-US" dirty="0">
                 <a:sym typeface="Wingdings" panose="05000000000000000000" pitchFamily="2" charset="2"/>
               </a:rPr>
               <a:t> Short Digest</a:t>
@@ -21316,13 +20874,6 @@
   <p:clrMapOvr>
     <a:masterClrMapping/>
   </p:clrMapOvr>
-  <p:timing>
-    <p:tnLst>
-      <p:par>
-        <p:cTn id="1" dur="indefinite" restart="never" nodeType="tmRoot"/>
-      </p:par>
-    </p:tnLst>
-  </p:timing>
 </p:sld>
 </file>
 
@@ -21359,10 +20910,9 @@
           <a:lstStyle/>
           <a:p>
             <a:r>
-              <a:rPr lang="en-US" dirty="0" smtClean="0"/>
+              <a:rPr lang="en-US" dirty="0"/>
               <a:t>Block Puzzle</a:t>
             </a:r>
-            <a:endParaRPr lang="en-US" dirty="0"/>
           </a:p>
         </p:txBody>
       </p:sp>
@@ -21397,11 +20947,7 @@
             </a:pPr>
             <a:r>
               <a:rPr lang="en-US" dirty="0"/>
-              <a:t>The only way to find out a particular output value is to make random </a:t>
-            </a:r>
-            <a:r>
-              <a:rPr lang="en-US" dirty="0" smtClean="0"/>
-              <a:t>guesses</a:t>
+              <a:t>The only way to find out a particular output value is to make random guesses</a:t>
             </a:r>
           </a:p>
           <a:p>
@@ -21410,7 +20956,7 @@
               <a:buChar char="§"/>
             </a:pPr>
             <a:r>
-              <a:rPr lang="en-US" dirty="0" smtClean="0"/>
+              <a:rPr lang="en-US" dirty="0"/>
               <a:t>Like guessing a combination to a lock</a:t>
             </a:r>
           </a:p>
@@ -21420,7 +20966,7 @@
               <a:buChar char="Ø"/>
             </a:pPr>
             <a:r>
-              <a:rPr lang="en-US" dirty="0" smtClean="0"/>
+              <a:rPr lang="en-US" dirty="0"/>
               <a:t>In bitcoin, it will take a typical computer several years to solve a block</a:t>
             </a:r>
           </a:p>
@@ -21430,7 +20976,7 @@
               <a:buChar char="Ø"/>
             </a:pPr>
             <a:r>
-              <a:rPr lang="en-US" dirty="0" smtClean="0"/>
+              <a:rPr lang="en-US" dirty="0"/>
               <a:t>But with distributed peer to peer network, it takes on an average ten minutes, for someone to find a solution</a:t>
             </a:r>
           </a:p>
@@ -21440,7 +20986,7 @@
               <a:buChar char="Ø"/>
             </a:pPr>
             <a:r>
-              <a:rPr lang="en-US" dirty="0" smtClean="0"/>
+              <a:rPr lang="en-US" dirty="0"/>
               <a:t>The first person to solve the puzzle broadcasts their block and gets to have their block accepted to be added to the block chain</a:t>
             </a:r>
           </a:p>
@@ -21456,13 +21002,6 @@
   <p:clrMapOvr>
     <a:masterClrMapping/>
   </p:clrMapOvr>
-  <p:timing>
-    <p:tnLst>
-      <p:par>
-        <p:cTn id="1" dur="indefinite" restart="never" nodeType="tmRoot"/>
-      </p:par>
-    </p:tnLst>
-  </p:timing>
 </p:sld>
 </file>
 
@@ -21499,10 +21038,9 @@
           <a:lstStyle/>
           <a:p>
             <a:r>
-              <a:rPr lang="en-US" dirty="0" smtClean="0"/>
+              <a:rPr lang="en-US" dirty="0"/>
               <a:t>Occasional Conflicts</a:t>
             </a:r>
-            <a:endParaRPr lang="en-US" dirty="0"/>
           </a:p>
         </p:txBody>
       </p:sp>
@@ -21776,7 +21314,7 @@
               <a:buChar char="Ø"/>
             </a:pPr>
             <a:r>
-              <a:rPr lang="en-US" dirty="0" smtClean="0"/>
+              <a:rPr lang="en-US" dirty="0"/>
               <a:t>Unlikely for two people to solve the block at the same time</a:t>
             </a:r>
           </a:p>
@@ -21786,7 +21324,7 @@
               <a:buChar char="Ø"/>
             </a:pPr>
             <a:r>
-              <a:rPr lang="en-US" dirty="0" smtClean="0"/>
+              <a:rPr lang="en-US" dirty="0"/>
               <a:t>Occasionally however, two nodes can solve the block at the same time, leading to several possible branches</a:t>
             </a:r>
           </a:p>
@@ -21796,7 +21334,7 @@
               <a:buChar char="Ø"/>
             </a:pPr>
             <a:r>
-              <a:rPr lang="en-US" dirty="0" smtClean="0"/>
+              <a:rPr lang="en-US" dirty="0"/>
               <a:t>In this case, build on top of the branch you receive, other nodes may have received the blocks in different order</a:t>
             </a:r>
           </a:p>
@@ -21806,7 +21344,7 @@
               <a:buChar char="Ø"/>
             </a:pPr>
             <a:r>
-              <a:rPr lang="en-US" dirty="0" smtClean="0"/>
+              <a:rPr lang="en-US" dirty="0"/>
               <a:t>The tie is broken when someone solves the next block</a:t>
             </a:r>
           </a:p>
@@ -21816,7 +21354,7 @@
               <a:buChar char="Ø"/>
             </a:pPr>
             <a:r>
-              <a:rPr lang="en-US" b="1" dirty="0" smtClean="0"/>
+              <a:rPr lang="en-US" b="1" dirty="0"/>
               <a:t>Immediately switch to the longest chain</a:t>
             </a:r>
           </a:p>
@@ -21826,7 +21364,7 @@
               <a:buChar char="Ø"/>
             </a:pPr>
             <a:r>
-              <a:rPr lang="en-US" dirty="0" smtClean="0"/>
+              <a:rPr lang="en-US" dirty="0"/>
               <a:t>Extremely rare for multiple blocks to have been solved at the same time in a row</a:t>
             </a:r>
           </a:p>
@@ -21836,7 +21374,7 @@
               <a:buChar char="Ø"/>
             </a:pPr>
             <a:r>
-              <a:rPr lang="en-US" b="1" dirty="0" smtClean="0"/>
+              <a:rPr lang="en-US" b="1" dirty="0"/>
               <a:t>Quick stabilization</a:t>
             </a:r>
           </a:p>
@@ -21912,13 +21450,6 @@
   <p:clrMapOvr>
     <a:masterClrMapping/>
   </p:clrMapOvr>
-  <p:timing>
-    <p:tnLst>
-      <p:par>
-        <p:cTn id="1" dur="indefinite" restart="never" nodeType="tmRoot"/>
-      </p:par>
-    </p:tnLst>
-  </p:timing>
 </p:sld>
 </file>
 
@@ -21955,10 +21486,9 @@
           <a:lstStyle/>
           <a:p>
             <a:r>
-              <a:rPr lang="en-US" dirty="0" smtClean="0"/>
+              <a:rPr lang="en-US" dirty="0"/>
               <a:t>Block Chain Reordering Implications</a:t>
             </a:r>
-            <a:endParaRPr lang="en-US" dirty="0"/>
           </a:p>
         </p:txBody>
       </p:sp>
@@ -21981,7 +21511,7 @@
               <a:buFont typeface="Wingdings" panose="05000000000000000000" pitchFamily="2" charset="2"/>
               <a:buChar char="Ø"/>
             </a:pPr>
-            <a:endParaRPr lang="en-US" dirty="0" smtClean="0"/>
+            <a:endParaRPr lang="en-US" dirty="0"/>
           </a:p>
           <a:p>
             <a:pPr>
@@ -21995,7 +21525,7 @@
               <a:buFont typeface="Wingdings" panose="05000000000000000000" pitchFamily="2" charset="2"/>
               <a:buChar char="Ø"/>
             </a:pPr>
-            <a:endParaRPr lang="en-US" dirty="0" smtClean="0"/>
+            <a:endParaRPr lang="en-US" dirty="0"/>
           </a:p>
           <a:p>
             <a:pPr>
@@ -22003,7 +21533,7 @@
               <a:buChar char="Ø"/>
             </a:pPr>
             <a:r>
-              <a:rPr lang="en-US" dirty="0" smtClean="0"/>
+              <a:rPr lang="en-US" dirty="0"/>
               <a:t>Sometimes transactions can lose their place in the chain</a:t>
             </a:r>
           </a:p>
@@ -22013,10 +21543,9 @@
               <a:buChar char="Ø"/>
             </a:pPr>
             <a:r>
-              <a:rPr lang="en-US" dirty="0" smtClean="0"/>
+              <a:rPr lang="en-US" dirty="0"/>
               <a:t>Will be returned to the unprocessed pool and will be grabbed again later</a:t>
             </a:r>
-            <a:endParaRPr lang="en-US" dirty="0"/>
           </a:p>
         </p:txBody>
       </p:sp>
@@ -22030,13 +21559,6 @@
   <p:clrMapOvr>
     <a:masterClrMapping/>
   </p:clrMapOvr>
-  <p:timing>
-    <p:tnLst>
-      <p:par>
-        <p:cTn id="1" dur="indefinite" restart="never" nodeType="tmRoot"/>
-      </p:par>
-    </p:tnLst>
-  </p:timing>
 </p:sld>
 </file>
 
@@ -22073,10 +21595,9 @@
           <a:lstStyle/>
           <a:p>
             <a:r>
-              <a:rPr lang="en-US" dirty="0" smtClean="0"/>
+              <a:rPr lang="en-US" dirty="0"/>
               <a:t>Cryptographic Hash Locks Blocks in Place (1/2)</a:t>
             </a:r>
-            <a:endParaRPr lang="en-US" dirty="0"/>
           </a:p>
         </p:txBody>
       </p:sp>
@@ -22106,28 +21627,27 @@
           <a:lstStyle/>
           <a:p>
             <a:r>
-              <a:rPr lang="en-US" dirty="0" smtClean="0"/>
+              <a:rPr lang="en-US" dirty="0"/>
               <a:t>Solving a block involves trying to get the cryptographic hash of the block to be below a certain value</a:t>
             </a:r>
           </a:p>
           <a:p>
             <a:r>
-              <a:rPr lang="en-US" dirty="0" smtClean="0"/>
+              <a:rPr lang="en-US" dirty="0"/>
               <a:t>This can be done by guessing random numbers</a:t>
             </a:r>
           </a:p>
           <a:p>
             <a:r>
-              <a:rPr lang="en-US" dirty="0" smtClean="0"/>
+              <a:rPr lang="en-US" dirty="0"/>
               <a:t>The hash output is the unique identifier of a block</a:t>
             </a:r>
           </a:p>
           <a:p>
             <a:r>
-              <a:rPr lang="en-US" dirty="0" smtClean="0"/>
+              <a:rPr lang="en-US" dirty="0"/>
               <a:t>This hash will be the next block’s previous reference</a:t>
             </a:r>
-            <a:endParaRPr lang="en-US" dirty="0"/>
           </a:p>
         </p:txBody>
       </p:sp>
@@ -22199,13 +21719,6 @@
   <p:clrMapOvr>
     <a:masterClrMapping/>
   </p:clrMapOvr>
-  <p:timing>
-    <p:tnLst>
-      <p:par>
-        <p:cTn id="1" dur="indefinite" restart="never" nodeType="tmRoot"/>
-      </p:par>
-    </p:tnLst>
-  </p:timing>
 </p:sld>
 </file>
 
@@ -22247,10 +21760,9 @@
           <a:lstStyle/>
           <a:p>
             <a:r>
-              <a:rPr lang="en-US" dirty="0" smtClean="0"/>
+              <a:rPr lang="en-US" dirty="0"/>
               <a:t>One line introduction!</a:t>
             </a:r>
-            <a:endParaRPr lang="en-US" dirty="0"/>
           </a:p>
         </p:txBody>
       </p:sp>
@@ -22272,7 +21784,7 @@
             <a:pPr marL="0" indent="0">
               <a:buNone/>
             </a:pPr>
-            <a:endParaRPr lang="en-US" dirty="0" smtClean="0"/>
+            <a:endParaRPr lang="en-US" dirty="0"/>
           </a:p>
           <a:p>
             <a:pPr marL="0" indent="0">
@@ -22285,18 +21797,9 @@
               <a:buNone/>
             </a:pPr>
             <a:r>
-              <a:rPr lang="en-US" dirty="0" smtClean="0"/>
-              <a:t>“</a:t>
-            </a:r>
-            <a:r>
               <a:rPr lang="en-US" dirty="0"/>
-              <a:t>The blockchain is an incorruptible digital ledger of economic transactions that can be programmed to record not just financial transactions but virtually everything of value</a:t>
-            </a:r>
-            <a:r>
-              <a:rPr lang="en-US" dirty="0" smtClean="0"/>
-              <a:t>.”</a:t>
-            </a:r>
-            <a:endParaRPr lang="en-US" dirty="0"/>
+              <a:t>“The blockchain is an incorruptible digital ledger of economic transactions that can be programmed to record not just financial transactions but virtually everything of value.”</a:t>
+            </a:r>
           </a:p>
         </p:txBody>
       </p:sp>
@@ -22310,13 +21813,6 @@
   <p:clrMapOvr>
     <a:masterClrMapping/>
   </p:clrMapOvr>
-  <p:timing>
-    <p:tnLst>
-      <p:par>
-        <p:cTn id="1" dur="indefinite" restart="never" nodeType="tmRoot"/>
-      </p:par>
-    </p:tnLst>
-  </p:timing>
 </p:sld>
 </file>
 
@@ -22354,13 +21850,8 @@
           <a:p>
             <a:r>
               <a:rPr lang="en-US" dirty="0"/>
-              <a:t>Cryptographic Hash Locks Blocks in </a:t>
-            </a:r>
-            <a:r>
-              <a:rPr lang="en-US" dirty="0" smtClean="0"/>
-              <a:t>Place (2/2)</a:t>
-            </a:r>
-            <a:endParaRPr lang="en-US" dirty="0"/>
+              <a:t>Cryptographic Hash Locks Blocks in Place (2/2)</a:t>
+            </a:r>
           </a:p>
         </p:txBody>
       </p:sp>
@@ -22380,16 +21871,15 @@
           <a:lstStyle/>
           <a:p>
             <a:r>
-              <a:rPr lang="en-US" dirty="0" smtClean="0"/>
+              <a:rPr lang="en-US" dirty="0"/>
               <a:t>There is no way to switch out a block in the middle of the chain</a:t>
             </a:r>
           </a:p>
           <a:p>
             <a:r>
-              <a:rPr lang="en-US" dirty="0" smtClean="0"/>
+              <a:rPr lang="en-US" dirty="0"/>
               <a:t>A block cannot be solved before the previous block is solved, because the previous block’s hash will also go through the current’s block hash function</a:t>
             </a:r>
-            <a:endParaRPr lang="en-US" dirty="0"/>
           </a:p>
         </p:txBody>
       </p:sp>
@@ -22432,13 +21922,6 @@
   <p:clrMapOvr>
     <a:masterClrMapping/>
   </p:clrMapOvr>
-  <p:timing>
-    <p:tnLst>
-      <p:par>
-        <p:cTn id="1" dur="indefinite" restart="never" nodeType="tmRoot"/>
-      </p:par>
-    </p:tnLst>
-  </p:timing>
 </p:sld>
 </file>
 
@@ -22475,10 +21958,9 @@
           <a:lstStyle/>
           <a:p>
             <a:r>
-              <a:rPr lang="en-US" dirty="0" smtClean="0"/>
+              <a:rPr lang="en-US" dirty="0"/>
               <a:t>Agenda</a:t>
             </a:r>
-            <a:endParaRPr lang="en-US" dirty="0"/>
           </a:p>
         </p:txBody>
       </p:sp>
@@ -22502,7 +21984,7 @@
               <a:buChar char="Ø"/>
             </a:pPr>
             <a:r>
-              <a:rPr lang="en-US" dirty="0" smtClean="0"/>
+              <a:rPr lang="en-US" dirty="0"/>
               <a:t>Introduction</a:t>
             </a:r>
           </a:p>
@@ -22512,7 +21994,7 @@
               <a:buChar char="Ø"/>
             </a:pPr>
             <a:r>
-              <a:rPr lang="en-US" dirty="0" smtClean="0"/>
+              <a:rPr lang="en-US" dirty="0"/>
               <a:t>Motivation</a:t>
             </a:r>
           </a:p>
@@ -22522,7 +22004,7 @@
               <a:buChar char="Ø"/>
             </a:pPr>
             <a:r>
-              <a:rPr lang="en-US" dirty="0" smtClean="0"/>
+              <a:rPr lang="en-US" dirty="0"/>
               <a:t>Technical Overview</a:t>
             </a:r>
           </a:p>
@@ -22542,7 +22024,7 @@
               <a:buChar char="Ø"/>
             </a:pPr>
             <a:r>
-              <a:rPr lang="en-US" dirty="0" smtClean="0">
+              <a:rPr lang="en-US" dirty="0">
                 <a:solidFill>
                   <a:srgbClr val="FF0000"/>
                 </a:solidFill>
@@ -22556,10 +22038,9 @@
               <a:buChar char="Ø"/>
             </a:pPr>
             <a:r>
-              <a:rPr lang="en-US" dirty="0" smtClean="0"/>
+              <a:rPr lang="en-US" dirty="0"/>
               <a:t>Future scope</a:t>
             </a:r>
-            <a:endParaRPr lang="en-US" dirty="0"/>
           </a:p>
         </p:txBody>
       </p:sp>
@@ -22573,13 +22054,6 @@
   <p:clrMapOvr>
     <a:masterClrMapping/>
   </p:clrMapOvr>
-  <p:timing>
-    <p:tnLst>
-      <p:par>
-        <p:cTn id="1" dur="indefinite" restart="never" nodeType="tmRoot"/>
-      </p:par>
-    </p:tnLst>
-  </p:timing>
 </p:sld>
 </file>
 
@@ -22616,10 +22090,9 @@
           <a:lstStyle/>
           <a:p>
             <a:r>
-              <a:rPr lang="en-US" dirty="0" smtClean="0"/>
+              <a:rPr lang="en-US" dirty="0"/>
               <a:t>Strengths</a:t>
             </a:r>
-            <a:endParaRPr lang="en-US" dirty="0"/>
           </a:p>
         </p:txBody>
       </p:sp>
@@ -22643,7 +22116,7 @@
               <a:buChar char="Ø"/>
             </a:pPr>
             <a:r>
-              <a:rPr lang="en-US" dirty="0" smtClean="0"/>
+              <a:rPr lang="en-US" dirty="0"/>
               <a:t>No government control</a:t>
             </a:r>
           </a:p>
@@ -22653,10 +22126,9 @@
               <a:buChar char="Ø"/>
             </a:pPr>
             <a:r>
-              <a:rPr lang="en-US" dirty="0" smtClean="0"/>
+              <a:rPr lang="en-US" dirty="0"/>
               <a:t>Lower global transaction costs</a:t>
             </a:r>
-            <a:endParaRPr lang="en-US" dirty="0" smtClean="0"/>
           </a:p>
           <a:p>
             <a:pPr>
@@ -22664,12 +22136,8 @@
               <a:buChar char="Ø"/>
             </a:pPr>
             <a:r>
-              <a:rPr lang="en-US" dirty="0" smtClean="0"/>
-              <a:t>Complex </a:t>
-            </a:r>
-            <a:r>
-              <a:rPr lang="en-US" dirty="0" smtClean="0"/>
-              <a:t>mathematical computations make the system very secure and immutable</a:t>
+              <a:rPr lang="en-US" dirty="0"/>
+              <a:t>Complex mathematical computations make the system very secure and immutable</a:t>
             </a:r>
           </a:p>
           <a:p>
@@ -22678,7 +22146,7 @@
               <a:buChar char="Ø"/>
             </a:pPr>
             <a:r>
-              <a:rPr lang="en-US" dirty="0" smtClean="0"/>
+              <a:rPr lang="en-US" dirty="0"/>
               <a:t>Anyone can join the blockchain network as a node/miner</a:t>
             </a:r>
           </a:p>
@@ -22688,7 +22156,7 @@
               <a:buChar char="Ø"/>
             </a:pPr>
             <a:r>
-              <a:rPr lang="en-US" dirty="0" smtClean="0"/>
+              <a:rPr lang="en-US" dirty="0"/>
               <a:t>Transparency, every node has an entire copy of all the transactions ever made</a:t>
             </a:r>
           </a:p>
@@ -22698,10 +22166,9 @@
               <a:buChar char="Ø"/>
             </a:pPr>
             <a:r>
-              <a:rPr lang="en-US" dirty="0" smtClean="0"/>
+              <a:rPr lang="en-US" dirty="0"/>
               <a:t>Peer to peer means no single point of failure</a:t>
             </a:r>
-            <a:endParaRPr lang="en-US" dirty="0"/>
           </a:p>
         </p:txBody>
       </p:sp>
@@ -22715,13 +22182,6 @@
   <p:clrMapOvr>
     <a:masterClrMapping/>
   </p:clrMapOvr>
-  <p:timing>
-    <p:tnLst>
-      <p:par>
-        <p:cTn id="1" dur="indefinite" restart="never" nodeType="tmRoot"/>
-      </p:par>
-    </p:tnLst>
-  </p:timing>
 </p:sld>
 </file>
 
@@ -22758,10 +22218,9 @@
           <a:lstStyle/>
           <a:p>
             <a:r>
-              <a:rPr lang="en-US" dirty="0" smtClean="0"/>
+              <a:rPr lang="en-US" dirty="0"/>
               <a:t>Weaknesses</a:t>
             </a:r>
-            <a:endParaRPr lang="en-US" dirty="0"/>
           </a:p>
         </p:txBody>
       </p:sp>
@@ -22792,7 +22251,7 @@
               <a:buChar char="Ø"/>
             </a:pPr>
             <a:r>
-              <a:rPr lang="en-US" dirty="0" smtClean="0"/>
+              <a:rPr lang="en-US" dirty="0"/>
               <a:t>Difficult to exchange for other currencies</a:t>
             </a:r>
           </a:p>
@@ -22802,7 +22261,7 @@
               <a:buChar char="Ø"/>
             </a:pPr>
             <a:r>
-              <a:rPr lang="en-US" dirty="0" smtClean="0"/>
+              <a:rPr lang="en-US" dirty="0"/>
               <a:t>No government control leads to illegal activities</a:t>
             </a:r>
           </a:p>
@@ -22812,7 +22271,7 @@
               <a:buChar char="Ø"/>
             </a:pPr>
             <a:r>
-              <a:rPr lang="en-US" dirty="0" smtClean="0"/>
+              <a:rPr lang="en-US" dirty="0"/>
               <a:t>Mining/Solving blocks uses huge processing power</a:t>
             </a:r>
           </a:p>
@@ -22822,12 +22281,8 @@
               <a:buChar char="Ø"/>
             </a:pPr>
             <a:r>
-              <a:rPr lang="en-US" dirty="0" smtClean="0"/>
-              <a:t>Decentralization </a:t>
-            </a:r>
-            <a:r>
-              <a:rPr lang="en-US" dirty="0" smtClean="0"/>
-              <a:t>leads to “No trust”!</a:t>
+              <a:rPr lang="en-US" dirty="0"/>
+              <a:t>Decentralization leads to “No trust”!</a:t>
             </a:r>
           </a:p>
           <a:p>
@@ -22836,10 +22291,9 @@
               <a:buChar char="§"/>
             </a:pPr>
             <a:r>
-              <a:rPr lang="en-US" dirty="0" smtClean="0"/>
+              <a:rPr lang="en-US" dirty="0"/>
               <a:t>We trust our banks or if something goes wrong, we can sue our bank. In bitcoin we deal with anonymous strangers, so one cannot trust anyone.</a:t>
             </a:r>
-            <a:endParaRPr lang="en-US" dirty="0"/>
           </a:p>
           <a:p>
             <a:pPr>
@@ -22847,7 +22301,7 @@
               <a:buChar char="Ø"/>
             </a:pPr>
             <a:r>
-              <a:rPr lang="en-US" dirty="0" smtClean="0"/>
+              <a:rPr lang="en-US" dirty="0"/>
               <a:t>DIY bitcoin = Risky</a:t>
             </a:r>
           </a:p>
@@ -22857,7 +22311,7 @@
               <a:buChar char="§"/>
             </a:pPr>
             <a:r>
-              <a:rPr lang="en-US" dirty="0" smtClean="0"/>
+              <a:rPr lang="en-US" dirty="0"/>
               <a:t>Bitcoin software hides the scripting layer, one could write their own</a:t>
             </a:r>
           </a:p>
@@ -22867,7 +22321,7 @@
               <a:buChar char="§"/>
             </a:pPr>
             <a:r>
-              <a:rPr lang="en-US" dirty="0" smtClean="0"/>
+              <a:rPr lang="en-US" dirty="0"/>
               <a:t>Over 2600 bitcoins were lost in a single batch of transactions due to malformed address</a:t>
             </a:r>
           </a:p>
@@ -22877,7 +22331,7 @@
               <a:buChar char="§"/>
             </a:pPr>
             <a:r>
-              <a:rPr lang="en-US" dirty="0" smtClean="0"/>
+              <a:rPr lang="en-US" dirty="0"/>
               <a:t>Since there is no central authority, any user error mistakes can cause permanent loss of bitcoins from the economy</a:t>
             </a:r>
           </a:p>
@@ -22887,7 +22341,7 @@
               <a:buChar char="Ø"/>
             </a:pPr>
             <a:r>
-              <a:rPr lang="en-US" dirty="0" smtClean="0"/>
+              <a:rPr lang="en-US" dirty="0"/>
               <a:t>If a user loses their private key, any funds associated with the corresponding public key will be lost forever</a:t>
             </a:r>
           </a:p>
@@ -22897,14 +22351,9 @@
               <a:buChar char="§"/>
             </a:pPr>
             <a:r>
-              <a:rPr lang="en-US" dirty="0" smtClean="0"/>
-              <a:t>And because users will likely lose their private keys due to technical glitches, bitcoin currency will eventually be a deflationary one</a:t>
-            </a:r>
-            <a:r>
-              <a:rPr lang="en-US" dirty="0" smtClean="0"/>
-              <a:t>.</a:t>
-            </a:r>
-            <a:endParaRPr lang="en-US" dirty="0" smtClean="0"/>
+              <a:rPr lang="en-US" dirty="0"/>
+              <a:t>And because users will likely lose their private keys due to technical glitches, bitcoin currency will eventually be a deflationary one.</a:t>
+            </a:r>
           </a:p>
         </p:txBody>
       </p:sp>
@@ -22918,13 +22367,6 @@
   <p:clrMapOvr>
     <a:masterClrMapping/>
   </p:clrMapOvr>
-  <p:timing>
-    <p:tnLst>
-      <p:par>
-        <p:cTn id="1" dur="indefinite" restart="never" nodeType="tmRoot"/>
-      </p:par>
-    </p:tnLst>
-  </p:timing>
 </p:sld>
 </file>
 
@@ -22961,10 +22403,9 @@
           <a:lstStyle/>
           <a:p>
             <a:r>
-              <a:rPr lang="en-US" dirty="0" smtClean="0"/>
+              <a:rPr lang="en-US" dirty="0"/>
               <a:t>Agenda</a:t>
             </a:r>
-            <a:endParaRPr lang="en-US" dirty="0"/>
           </a:p>
         </p:txBody>
       </p:sp>
@@ -22988,7 +22429,7 @@
               <a:buChar char="Ø"/>
             </a:pPr>
             <a:r>
-              <a:rPr lang="en-US" dirty="0" smtClean="0"/>
+              <a:rPr lang="en-US" dirty="0"/>
               <a:t>Introduction</a:t>
             </a:r>
           </a:p>
@@ -22998,7 +22439,7 @@
               <a:buChar char="Ø"/>
             </a:pPr>
             <a:r>
-              <a:rPr lang="en-US" dirty="0" smtClean="0"/>
+              <a:rPr lang="en-US" dirty="0"/>
               <a:t>Motivation</a:t>
             </a:r>
           </a:p>
@@ -23008,7 +22449,7 @@
               <a:buChar char="Ø"/>
             </a:pPr>
             <a:r>
-              <a:rPr lang="en-US" dirty="0" smtClean="0"/>
+              <a:rPr lang="en-US" dirty="0"/>
               <a:t>Technical Overview</a:t>
             </a:r>
           </a:p>
@@ -23028,7 +22469,7 @@
               <a:buChar char="Ø"/>
             </a:pPr>
             <a:r>
-              <a:rPr lang="en-US" dirty="0" smtClean="0"/>
+              <a:rPr lang="en-US" dirty="0"/>
               <a:t>Strengths/Weaknesses</a:t>
             </a:r>
           </a:p>
@@ -23038,18 +22479,13 @@
               <a:buChar char="Ø"/>
             </a:pPr>
             <a:r>
-              <a:rPr lang="en-US" dirty="0" smtClean="0">
+              <a:rPr lang="en-US" dirty="0">
                 <a:solidFill>
                   <a:srgbClr val="FF0000"/>
                 </a:solidFill>
               </a:rPr>
               <a:t>Future scope</a:t>
             </a:r>
-            <a:endParaRPr lang="en-US" dirty="0">
-              <a:solidFill>
-                <a:srgbClr val="FF0000"/>
-              </a:solidFill>
-            </a:endParaRPr>
           </a:p>
         </p:txBody>
       </p:sp>
@@ -23063,13 +22499,6 @@
   <p:clrMapOvr>
     <a:masterClrMapping/>
   </p:clrMapOvr>
-  <p:timing>
-    <p:tnLst>
-      <p:par>
-        <p:cTn id="1" dur="indefinite" restart="never" nodeType="tmRoot"/>
-      </p:par>
-    </p:tnLst>
-  </p:timing>
 </p:sld>
 </file>
 
@@ -23109,13 +22538,8 @@
           <a:p>
             <a:r>
               <a:rPr lang="en-US" dirty="0"/>
-              <a:t>A brief summary of some use cases gaining </a:t>
-            </a:r>
-            <a:r>
-              <a:rPr lang="en-US" dirty="0" smtClean="0"/>
-              <a:t>momentum</a:t>
-            </a:r>
-            <a:endParaRPr lang="en-US" dirty="0"/>
+              <a:t>A brief summary of some use cases gaining momentum</a:t>
+            </a:r>
           </a:p>
         </p:txBody>
       </p:sp>
@@ -23146,20 +22570,8 @@
               <a:buChar char="Ø"/>
             </a:pPr>
             <a:r>
-              <a:rPr lang="en-US" dirty="0" smtClean="0"/>
-              <a:t>Document </a:t>
-            </a:r>
-            <a:r>
               <a:rPr lang="en-US" dirty="0"/>
-              <a:t>and contract </a:t>
-            </a:r>
-            <a:r>
-              <a:rPr lang="en-US" dirty="0" smtClean="0"/>
-              <a:t>digitization, </a:t>
-            </a:r>
-            <a:r>
-              <a:rPr lang="en-US" dirty="0"/>
-              <a:t>management and exploitation</a:t>
+              <a:t>Document and contract digitization, management and exploitation</a:t>
             </a:r>
           </a:p>
           <a:p>
@@ -23188,12 +22600,8 @@
               <a:buChar char="Ø"/>
             </a:pPr>
             <a:r>
-              <a:rPr lang="en-US" dirty="0" smtClean="0"/>
-              <a:t>Decentralized </a:t>
-            </a:r>
-            <a:r>
               <a:rPr lang="en-US" dirty="0"/>
-              <a:t>and cloud services including patient records and healthcare support</a:t>
+              <a:t>Decentralized and cloud services including patient records and healthcare support</a:t>
             </a:r>
           </a:p>
           <a:p>
@@ -23243,11 +22651,7 @@
             </a:pPr>
             <a:r>
               <a:rPr lang="en-US" dirty="0"/>
-              <a:t>Facilitation of sales and trading of digital assets and digital rights </a:t>
-            </a:r>
-            <a:r>
-              <a:rPr lang="en-US" dirty="0" smtClean="0"/>
-              <a:t>management</a:t>
+              <a:t>Facilitation of sales and trading of digital assets and digital rights management</a:t>
             </a:r>
           </a:p>
           <a:p>
@@ -23256,18 +22660,9 @@
               <a:buChar char="Ø"/>
             </a:pPr>
             <a:r>
-              <a:rPr lang="en-US" dirty="0" smtClean="0"/>
-              <a:t>Nine </a:t>
-            </a:r>
-            <a:r>
               <a:rPr lang="en-US" dirty="0"/>
-              <a:t>major banks (including JP Morgan and Goldman Sachs) recently joined a partnership to develop blockchain technologies</a:t>
-            </a:r>
-            <a:r>
-              <a:rPr lang="en-US" dirty="0" smtClean="0"/>
-              <a:t>.</a:t>
-            </a:r>
-            <a:endParaRPr lang="en-US" dirty="0"/>
+              <a:t>Nine major banks (including JP Morgan and Goldman Sachs) recently joined a partnership to develop blockchain technologies.</a:t>
+            </a:r>
           </a:p>
         </p:txBody>
       </p:sp>
@@ -23281,13 +22676,6 @@
   <p:clrMapOvr>
     <a:masterClrMapping/>
   </p:clrMapOvr>
-  <p:timing>
-    <p:tnLst>
-      <p:par>
-        <p:cTn id="1" dur="indefinite" restart="never" nodeType="tmRoot"/>
-      </p:par>
-    </p:tnLst>
-  </p:timing>
 </p:sld>
 </file>
 
@@ -23324,10 +22712,9 @@
           <a:lstStyle/>
           <a:p>
             <a:r>
-              <a:rPr lang="en-US" dirty="0" smtClean="0"/>
+              <a:rPr lang="en-US" dirty="0"/>
               <a:t>Blockchain Startups</a:t>
             </a:r>
-            <a:endParaRPr lang="en-US" dirty="0"/>
           </a:p>
         </p:txBody>
       </p:sp>
@@ -23367,13 +22754,6 @@
   <p:clrMapOvr>
     <a:masterClrMapping/>
   </p:clrMapOvr>
-  <p:timing>
-    <p:tnLst>
-      <p:par>
-        <p:cTn id="1" dur="indefinite" restart="never" nodeType="tmRoot"/>
-      </p:par>
-    </p:tnLst>
-  </p:timing>
 </p:sld>
 </file>
 
@@ -23410,10 +22790,9 @@
           <a:lstStyle/>
           <a:p>
             <a:r>
-              <a:rPr lang="en-US" dirty="0" smtClean="0"/>
+              <a:rPr lang="en-US" dirty="0"/>
               <a:t>References</a:t>
             </a:r>
-            <a:endParaRPr lang="en-US" dirty="0"/>
           </a:p>
         </p:txBody>
       </p:sp>
@@ -23441,7 +22820,7 @@
               <a:buNone/>
             </a:pPr>
             <a:r>
-              <a:rPr lang="en-US" dirty="0" smtClean="0">
+              <a:rPr lang="en-US" dirty="0">
                 <a:hlinkClick r:id="rId2"/>
               </a:rPr>
               <a:t>https://bitcoin.org/en/</a:t>
@@ -23453,48 +22832,36 @@
               <a:buNone/>
             </a:pPr>
             <a:r>
-              <a:rPr lang="en-US" dirty="0" smtClean="0">
+              <a:rPr lang="en-US" dirty="0">
                 <a:hlinkClick r:id="rId3"/>
               </a:rPr>
               <a:t>https://www.blockchain.com/</a:t>
             </a:r>
-            <a:endParaRPr lang="en-US" dirty="0" smtClean="0"/>
+            <a:endParaRPr lang="en-US" dirty="0"/>
           </a:p>
           <a:p>
             <a:pPr marL="0" indent="0">
               <a:buNone/>
             </a:pPr>
             <a:r>
-              <a:rPr lang="en-US" dirty="0" smtClean="0">
+              <a:rPr lang="en-US" dirty="0">
                 <a:hlinkClick r:id="rId4"/>
               </a:rPr>
               <a:t>http://blockgeeks.com/guides/what-is-blockchain-technology-a-step-by-step-guide-than-anyone-can-understand/</a:t>
             </a:r>
-            <a:endParaRPr lang="en-US" dirty="0" smtClean="0"/>
+            <a:endParaRPr lang="en-US" dirty="0"/>
           </a:p>
           <a:p>
             <a:pPr marL="0" indent="0">
               <a:buNone/>
             </a:pPr>
             <a:r>
-              <a:rPr lang="en-US" dirty="0" smtClean="0">
-                <a:hlinkClick r:id="rId5"/>
-              </a:rPr>
-              <a:t>https</a:t>
-            </a:r>
-            <a:r>
               <a:rPr lang="en-US" dirty="0">
                 <a:hlinkClick r:id="rId5"/>
               </a:rPr>
-              <a:t>://</a:t>
-            </a:r>
-            <a:r>
-              <a:rPr lang="en-US" dirty="0" smtClean="0">
-                <a:hlinkClick r:id="rId5"/>
-              </a:rPr>
-              <a:t>www.linkedin.com/pulse/blockchain-non-financial-services-use-cases-paul-forrest</a:t>
-            </a:r>
-            <a:endParaRPr lang="en-US" dirty="0" smtClean="0"/>
+              <a:t>https://www.linkedin.com/pulse/blockchain-non-financial-services-use-cases-paul-forrest</a:t>
+            </a:r>
+            <a:endParaRPr lang="en-US" dirty="0"/>
           </a:p>
           <a:p>
             <a:pPr marL="0" indent="0">
@@ -23504,15 +22871,9 @@
               <a:rPr lang="en-US" dirty="0">
                 <a:hlinkClick r:id="rId6"/>
               </a:rPr>
-              <a:t>https://</a:t>
-            </a:r>
-            <a:r>
-              <a:rPr lang="en-US" dirty="0" smtClean="0">
-                <a:hlinkClick r:id="rId6"/>
-              </a:rPr>
-              <a:t>www.youtube.com/watch?v=Lx9zgZCMqXE</a:t>
-            </a:r>
-            <a:endParaRPr lang="en-US" dirty="0" smtClean="0"/>
+              <a:t>https://www.youtube.com/watch?v=Lx9zgZCMqXE</a:t>
+            </a:r>
+            <a:endParaRPr lang="en-US" dirty="0"/>
           </a:p>
           <a:p>
             <a:pPr marL="0" indent="0">
@@ -23522,15 +22883,9 @@
               <a:rPr lang="en-US" dirty="0">
                 <a:hlinkClick r:id="rId7"/>
               </a:rPr>
-              <a:t>http://</a:t>
-            </a:r>
-            <a:r>
-              <a:rPr lang="en-US" dirty="0" smtClean="0">
-                <a:hlinkClick r:id="rId7"/>
-              </a:rPr>
-              <a:t>scet.berkeley.edu/wp-content/uploads/BlockchainPaper.pdf</a:t>
-            </a:r>
-            <a:endParaRPr lang="en-US" dirty="0" smtClean="0"/>
+              <a:t>http://scet.berkeley.edu/wp-content/uploads/BlockchainPaper.pdf</a:t>
+            </a:r>
+            <a:endParaRPr lang="en-US" dirty="0"/>
           </a:p>
           <a:p>
             <a:pPr marL="0" indent="0">
@@ -23538,31 +22893,26 @@
             </a:pPr>
             <a:r>
               <a:rPr lang="en-US" dirty="0"/>
-              <a:t>http://</a:t>
-            </a:r>
-            <a:r>
-              <a:rPr lang="en-US" dirty="0" smtClean="0"/>
-              <a:t>marmelab.com/blog/2016/04/28/blockchain-for-web-developers-the-theory.html</a:t>
-            </a:r>
-            <a:endParaRPr lang="en-US" dirty="0"/>
+              <a:t>http://marmelab.com/blog/2016/04/28/blockchain-for-web-developers-the-theory.html</a:t>
+            </a:r>
           </a:p>
           <a:p>
             <a:pPr marL="0" indent="0">
               <a:buNone/>
             </a:pPr>
-            <a:endParaRPr lang="en-US" dirty="0" smtClean="0"/>
+            <a:endParaRPr lang="en-US" dirty="0"/>
           </a:p>
           <a:p>
             <a:pPr marL="0" indent="0">
               <a:buNone/>
             </a:pPr>
-            <a:endParaRPr lang="en-US" dirty="0" smtClean="0"/>
+            <a:endParaRPr lang="en-US" dirty="0"/>
           </a:p>
           <a:p>
             <a:pPr marL="0" indent="0">
               <a:buNone/>
             </a:pPr>
-            <a:endParaRPr lang="en-US" dirty="0" smtClean="0"/>
+            <a:endParaRPr lang="en-US" dirty="0"/>
           </a:p>
           <a:p>
             <a:pPr marL="0" indent="0">
@@ -23588,13 +22938,6 @@
   <p:clrMapOvr>
     <a:masterClrMapping/>
   </p:clrMapOvr>
-  <p:timing>
-    <p:tnLst>
-      <p:par>
-        <p:cTn id="1" dur="indefinite" restart="never" nodeType="tmRoot"/>
-      </p:par>
-    </p:tnLst>
-  </p:timing>
 </p:sld>
 </file>
 
@@ -23649,13 +22992,6 @@
   <p:clrMapOvr>
     <a:masterClrMapping/>
   </p:clrMapOvr>
-  <p:timing>
-    <p:tnLst>
-      <p:par>
-        <p:cTn id="1" dur="indefinite" restart="never" nodeType="tmRoot"/>
-      </p:par>
-    </p:tnLst>
-  </p:timing>
 </p:sld>
 </file>
 
@@ -23692,7 +23028,7 @@
           <a:lstStyle/>
           <a:p>
             <a:r>
-              <a:rPr lang="en-US" b="1" dirty="0" smtClean="0"/>
+              <a:rPr lang="en-US" b="1" dirty="0"/>
               <a:t>Who will use the blockchain?</a:t>
             </a:r>
             <a:endParaRPr lang="en-US" dirty="0"/>
@@ -23717,12 +23053,8 @@
           <a:lstStyle/>
           <a:p>
             <a:r>
-              <a:rPr lang="en-US" dirty="0" smtClean="0"/>
-              <a:t>As </a:t>
-            </a:r>
-            <a:r>
               <a:rPr lang="en-US" dirty="0"/>
-              <a:t>web infrastructure, you don’t need to know about the blockchain for it to be useful in your life.</a:t>
+              <a:t>As web infrastructure, you don’t need to know about the blockchain for it to be useful in your life.</a:t>
             </a:r>
           </a:p>
           <a:p>
@@ -23758,13 +23090,6 @@
   <p:clrMapOvr>
     <a:masterClrMapping/>
   </p:clrMapOvr>
-  <p:timing>
-    <p:tnLst>
-      <p:par>
-        <p:cTn id="1" dur="indefinite" restart="never" nodeType="tmRoot"/>
-      </p:par>
-    </p:tnLst>
-  </p:timing>
 </p:sld>
 </file>
 
@@ -23801,10 +23126,9 @@
           <a:lstStyle/>
           <a:p>
             <a:r>
-              <a:rPr lang="en-US" dirty="0" smtClean="0"/>
+              <a:rPr lang="en-US" dirty="0"/>
               <a:t>Agenda</a:t>
             </a:r>
-            <a:endParaRPr lang="en-US" dirty="0"/>
           </a:p>
         </p:txBody>
       </p:sp>
@@ -23828,7 +23152,7 @@
               <a:buChar char="Ø"/>
             </a:pPr>
             <a:r>
-              <a:rPr lang="en-US" dirty="0" smtClean="0"/>
+              <a:rPr lang="en-US" dirty="0"/>
               <a:t>Introduction</a:t>
             </a:r>
           </a:p>
@@ -23838,7 +23162,7 @@
               <a:buChar char="Ø"/>
             </a:pPr>
             <a:r>
-              <a:rPr lang="en-US" dirty="0" smtClean="0">
+              <a:rPr lang="en-US" dirty="0">
                 <a:solidFill>
                   <a:srgbClr val="FF0000"/>
                 </a:solidFill>
@@ -23852,7 +23176,7 @@
               <a:buChar char="Ø"/>
             </a:pPr>
             <a:r>
-              <a:rPr lang="en-US" dirty="0" smtClean="0"/>
+              <a:rPr lang="en-US" dirty="0"/>
               <a:t>Technical Overview</a:t>
             </a:r>
           </a:p>
@@ -23872,7 +23196,7 @@
               <a:buChar char="Ø"/>
             </a:pPr>
             <a:r>
-              <a:rPr lang="en-US" dirty="0" smtClean="0"/>
+              <a:rPr lang="en-US" dirty="0"/>
               <a:t>Strengths/Weaknesses</a:t>
             </a:r>
           </a:p>
@@ -23882,10 +23206,9 @@
               <a:buChar char="Ø"/>
             </a:pPr>
             <a:r>
-              <a:rPr lang="en-US" dirty="0" smtClean="0"/>
+              <a:rPr lang="en-US" dirty="0"/>
               <a:t>Future scope</a:t>
             </a:r>
-            <a:endParaRPr lang="en-US" dirty="0"/>
           </a:p>
         </p:txBody>
       </p:sp>
@@ -23899,13 +23222,6 @@
   <p:clrMapOvr>
     <a:masterClrMapping/>
   </p:clrMapOvr>
-  <p:timing>
-    <p:tnLst>
-      <p:par>
-        <p:cTn id="1" dur="indefinite" restart="never" nodeType="tmRoot"/>
-      </p:par>
-    </p:tnLst>
-  </p:timing>
 </p:sld>
 </file>
 
@@ -23942,10 +23258,9 @@
           <a:lstStyle/>
           <a:p>
             <a:r>
-              <a:rPr lang="en-US" dirty="0" smtClean="0"/>
+              <a:rPr lang="en-US" dirty="0"/>
               <a:t>Anonymity</a:t>
             </a:r>
-            <a:endParaRPr lang="en-US" dirty="0"/>
           </a:p>
         </p:txBody>
       </p:sp>
@@ -24250,7 +23565,7 @@
               <a:buChar char="Ø"/>
             </a:pPr>
             <a:r>
-              <a:rPr lang="en-US" dirty="0" smtClean="0"/>
+              <a:rPr lang="en-US" dirty="0"/>
               <a:t>Use bitcoin network without ever revealing more than public key</a:t>
             </a:r>
           </a:p>
@@ -24261,11 +23576,7 @@
             </a:pPr>
             <a:r>
               <a:rPr lang="en-US" dirty="0"/>
-              <a:t>TOR networks hides the IP </a:t>
-            </a:r>
-            <a:r>
-              <a:rPr lang="en-US" dirty="0" smtClean="0"/>
-              <a:t>address</a:t>
+              <a:t>TOR networks hides the IP address</a:t>
             </a:r>
           </a:p>
           <a:p>
@@ -24274,7 +23585,7 @@
               <a:buChar char="Ø"/>
             </a:pPr>
             <a:r>
-              <a:rPr lang="en-US" dirty="0" smtClean="0"/>
+              <a:rPr lang="en-US" dirty="0"/>
               <a:t>Avoid linking public keys together by generating a new public key for every incoming transaction using the wallet software</a:t>
             </a:r>
           </a:p>
@@ -24290,13 +23601,6 @@
   <p:clrMapOvr>
     <a:masterClrMapping/>
   </p:clrMapOvr>
-  <p:timing>
-    <p:tnLst>
-      <p:par>
-        <p:cTn id="1" dur="indefinite" restart="never" nodeType="tmRoot"/>
-      </p:par>
-    </p:tnLst>
-  </p:timing>
 </p:sld>
 </file>
 
@@ -24351,13 +23655,6 @@
   <p:clrMapOvr>
     <a:masterClrMapping/>
   </p:clrMapOvr>
-  <p:timing>
-    <p:tnLst>
-      <p:par>
-        <p:cTn id="1" dur="indefinite" restart="never" nodeType="tmRoot"/>
-      </p:par>
-    </p:tnLst>
-  </p:timing>
 </p:sld>
 </file>
 
@@ -24399,10 +23696,9 @@
           <a:lstStyle/>
           <a:p>
             <a:r>
-              <a:rPr lang="en-US" dirty="0" smtClean="0"/>
+              <a:rPr lang="en-US" dirty="0"/>
               <a:t>Be your own bank!</a:t>
             </a:r>
-            <a:endParaRPr lang="en-US" dirty="0"/>
           </a:p>
         </p:txBody>
       </p:sp>
@@ -24423,11 +23719,7 @@
           <a:p>
             <a:r>
               <a:rPr lang="en-US" dirty="0"/>
-              <a:t>“The blockchain is an incorruptible digital ledger of economic transactions that can be programmed to record not just financial transactions but virtually everything of value</a:t>
-            </a:r>
-            <a:r>
-              <a:rPr lang="en-US" dirty="0" smtClean="0"/>
-              <a:t>.”</a:t>
+              <a:t>“The blockchain is an incorruptible digital ledger of economic transactions that can be programmed to record not just financial transactions but virtually everything of value.”</a:t>
             </a:r>
           </a:p>
           <a:p>
@@ -24456,13 +23748,6 @@
   <p:clrMapOvr>
     <a:masterClrMapping/>
   </p:clrMapOvr>
-  <p:timing>
-    <p:tnLst>
-      <p:par>
-        <p:cTn id="1" dur="indefinite" restart="never" nodeType="tmRoot"/>
-      </p:par>
-    </p:tnLst>
-  </p:timing>
 </p:sld>
 </file>
 
@@ -24523,7 +23808,7 @@
           </a:p>
           <a:p>
             <a:r>
-              <a:rPr lang="en-US" dirty="0" smtClean="0"/>
+              <a:rPr lang="en-US" dirty="0"/>
               <a:t>(Some intro about bitcoin or probably show a video!!)</a:t>
             </a:r>
           </a:p>
@@ -24532,16 +23817,11 @@
               <a:rPr lang="en-US" dirty="0"/>
               <a:t>Proponents envisage an “internet of value” that can make money flow as freely as data are flowing already.</a:t>
             </a:r>
-            <a:endParaRPr lang="en-US" dirty="0" smtClean="0"/>
           </a:p>
           <a:p>
             <a:r>
               <a:rPr lang="en-US" dirty="0"/>
-              <a:t>Cryptocurrencies, like bitcoin, are currencies that exist solely in digital. There are no physical golden coins with a big “B” on them. Moreover, owning these non-real coins entails a new idea of “ownership.” You don’t literally have it in your hands, or even in your bank account, but you have the ability to transfer “ownership” to someone else simply by creating a record in the blockchain. Rather than using bills, your transfer is pure data</a:t>
-            </a:r>
-            <a:r>
-              <a:rPr lang="en-US" dirty="0" smtClean="0"/>
-              <a:t>.</a:t>
+              <a:t>Cryptocurrencies, like bitcoin, are currencies that exist solely in digital. There are no physical golden coins with a big “B” on them. Moreover, owning these non-real coins entails a new idea of “ownership.” You don’t literally have it in your hands, or even in your bank account, but you have the ability to transfer “ownership” to someone else simply by creating a record in the blockchain. Rather than using bills, your transfer is pure data.</a:t>
             </a:r>
           </a:p>
           <a:p>
@@ -24562,13 +23842,6 @@
   <p:clrMapOvr>
     <a:masterClrMapping/>
   </p:clrMapOvr>
-  <p:timing>
-    <p:tnLst>
-      <p:par>
-        <p:cTn id="1" dur="indefinite" restart="never" nodeType="tmRoot"/>
-      </p:par>
-    </p:tnLst>
-  </p:timing>
 </p:sld>
 </file>
 
@@ -24634,16 +23907,8 @@
               <a:buNone/>
             </a:pPr>
             <a:r>
-              <a:rPr lang="en-US" dirty="0" smtClean="0"/>
-              <a:t>The </a:t>
-            </a:r>
-            <a:r>
               <a:rPr lang="en-US" dirty="0"/>
-              <a:t>blockchain network lives in a state of consensus, one that automatically checks in with itself every ten minutes.  A kind of self-auditing ecosystem of digital value, the network reconciles every transaction that happens in ten minute intervals. Each group of these transactions is referred to as a “block”. Two important properties result from this</a:t>
-            </a:r>
-            <a:r>
-              <a:rPr lang="en-US" dirty="0" smtClean="0"/>
-              <a:t>:</a:t>
+              <a:t>The blockchain network lives in a state of consensus, one that automatically checks in with itself every ten minutes.  A kind of self-auditing ecosystem of digital value, the network reconciles every transaction that happens in ten minute intervals. Each group of these transactions is referred to as a “block”. Two important properties result from this:</a:t>
             </a:r>
           </a:p>
           <a:p>
@@ -24661,20 +23926,12 @@
               <a:rPr lang="en-US" b="1" dirty="0"/>
               <a:t>Transparency</a:t>
             </a:r>
-            <a:r>
-              <a:rPr lang="en-US" dirty="0"/>
-              <a:t/>
-            </a:r>
             <a:br>
               <a:rPr lang="en-US" dirty="0"/>
             </a:br>
             <a:r>
               <a:rPr lang="en-US" dirty="0"/>
-              <a:t>data is embedded within network as a whole, by definition it is public</a:t>
-            </a:r>
-            <a:r>
-              <a:rPr lang="en-US" dirty="0" smtClean="0"/>
-              <a:t>.</a:t>
+              <a:t>data is embedded within network as a whole, by definition it is public.</a:t>
             </a:r>
           </a:p>
           <a:p>
@@ -24692,10 +23949,6 @@
             <a:r>
               <a:rPr lang="en-US" b="1" dirty="0"/>
               <a:t>It cannot be corrupted</a:t>
-            </a:r>
-            <a:r>
-              <a:rPr lang="en-US" dirty="0"/>
-              <a:t/>
             </a:r>
             <a:br>
               <a:rPr lang="en-US" dirty="0"/>
@@ -24720,13 +23973,6 @@
   <p:clrMapOvr>
     <a:masterClrMapping/>
   </p:clrMapOvr>
-  <p:timing>
-    <p:tnLst>
-      <p:par>
-        <p:cTn id="1" dur="indefinite" restart="never" nodeType="tmRoot"/>
-      </p:par>
-    </p:tnLst>
-  </p:timing>
 </p:sld>
 </file>
 
@@ -24763,10 +24009,9 @@
           <a:lstStyle/>
           <a:p>
             <a:r>
-              <a:rPr lang="en-US" dirty="0" smtClean="0"/>
+              <a:rPr lang="en-US" dirty="0"/>
               <a:t>Double Spending Problem</a:t>
             </a:r>
-            <a:endParaRPr lang="en-US" dirty="0"/>
           </a:p>
         </p:txBody>
       </p:sp>
@@ -25095,13 +24340,6 @@
   <p:clrMapOvr>
     <a:masterClrMapping/>
   </p:clrMapOvr>
-  <p:timing>
-    <p:tnLst>
-      <p:par>
-        <p:cTn id="1" dur="indefinite" restart="never" nodeType="tmRoot"/>
-      </p:par>
-    </p:tnLst>
-  </p:timing>
 </p:sld>
 </file>
 
@@ -25148,10 +24386,9 @@
               <a:buNone/>
             </a:pPr>
             <a:r>
-              <a:rPr lang="en-US" sz="4000" dirty="0" smtClean="0"/>
+              <a:rPr lang="en-US" sz="4000" dirty="0"/>
               <a:t>DIGITAL GOLD</a:t>
             </a:r>
-            <a:endParaRPr lang="en-US" sz="4000" dirty="0"/>
           </a:p>
         </p:txBody>
       </p:sp>
@@ -25425,10 +24662,9 @@
               <a:buNone/>
             </a:pPr>
             <a:r>
-              <a:rPr lang="en-US" sz="4000" dirty="0" smtClean="0"/>
+              <a:rPr lang="en-US" sz="4000" dirty="0"/>
               <a:t>“BITCOIN”</a:t>
             </a:r>
-            <a:endParaRPr lang="en-US" sz="4000" dirty="0"/>
           </a:p>
         </p:txBody>
       </p:sp>
@@ -25551,7 +24787,7 @@
           </p:nvPr>
         </p:nvPicPr>
         <p:blipFill>
-          <a:blip r:embed="rId2">
+          <a:blip r:embed="rId3">
             <a:extLst>
               <a:ext uri="{28A0092B-C50C-407E-A947-70E740481C1C}">
                 <a14:useLocalDpi xmlns:a14="http://schemas.microsoft.com/office/drawing/2010/main" val="0"/>
@@ -25629,10 +24865,9 @@
           <a:lstStyle/>
           <a:p>
             <a:r>
-              <a:rPr lang="en-US" dirty="0" smtClean="0"/>
+              <a:rPr lang="en-US" dirty="0"/>
               <a:t>Cryptocurrency</a:t>
             </a:r>
-            <a:endParaRPr lang="en-US" dirty="0"/>
           </a:p>
         </p:txBody>
       </p:sp>
@@ -25662,15 +24897,7 @@
             </a:pPr>
             <a:r>
               <a:rPr lang="en-US" dirty="0"/>
-              <a:t>M</a:t>
-            </a:r>
-            <a:r>
-              <a:rPr lang="en-US" dirty="0" smtClean="0"/>
-              <a:t>ake </a:t>
-            </a:r>
-            <a:r>
-              <a:rPr lang="en-US" dirty="0"/>
-              <a:t>money flow as freely as data are flowing already.</a:t>
+              <a:t>Make money flow as freely as data is flowing already.</a:t>
             </a:r>
           </a:p>
           <a:p>
@@ -25679,7 +24906,7 @@
               <a:buChar char="Ø"/>
             </a:pPr>
             <a:r>
-              <a:rPr lang="en-US" dirty="0" smtClean="0"/>
+              <a:rPr lang="en-US" dirty="0"/>
               <a:t>No physical form</a:t>
             </a:r>
           </a:p>
@@ -25690,11 +24917,7 @@
             </a:pPr>
             <a:r>
               <a:rPr lang="en-US" dirty="0"/>
-              <a:t>You don’t literally have it in your hands, or even in your bank </a:t>
-            </a:r>
-            <a:r>
-              <a:rPr lang="en-US" dirty="0" smtClean="0"/>
-              <a:t>account</a:t>
+              <a:t>You don’t literally have it in your hands, or even in your bank account</a:t>
             </a:r>
           </a:p>
           <a:p>
@@ -25703,16 +24926,8 @@
               <a:buChar char="§"/>
             </a:pPr>
             <a:r>
-              <a:rPr lang="en-US" dirty="0" smtClean="0"/>
-              <a:t>Ability </a:t>
-            </a:r>
-            <a:r>
               <a:rPr lang="en-US" dirty="0"/>
-              <a:t>to transfer “ownership” to someone else simply by creating a record in the </a:t>
-            </a:r>
-            <a:r>
-              <a:rPr lang="en-US" dirty="0" smtClean="0"/>
-              <a:t>blockchain</a:t>
+              <a:t>Ability to transfer “ownership” to someone else simply by creating a record in the blockchain</a:t>
             </a:r>
           </a:p>
           <a:p>
@@ -25721,12 +24936,8 @@
               <a:buChar char="Ø"/>
             </a:pPr>
             <a:r>
-              <a:rPr lang="en-US" dirty="0" smtClean="0"/>
-              <a:t>Owning </a:t>
-            </a:r>
-            <a:r>
               <a:rPr lang="en-US" dirty="0"/>
-              <a:t>bitcoin is merely having a claim on a piece of information sitting on the blockchain.</a:t>
+              <a:t>Owning bitcoin is merely having a claim on a piece of information sitting on the blockchain.</a:t>
             </a:r>
           </a:p>
           <a:p>
@@ -25777,13 +24988,6 @@
   <p:clrMapOvr>
     <a:masterClrMapping/>
   </p:clrMapOvr>
-  <p:timing>
-    <p:tnLst>
-      <p:par>
-        <p:cTn id="1" dur="indefinite" restart="never" nodeType="tmRoot"/>
-      </p:par>
-    </p:tnLst>
-  </p:timing>
 </p:sld>
 </file>
 
@@ -25820,10 +25024,9 @@
           <a:lstStyle/>
           <a:p>
             <a:r>
-              <a:rPr lang="en-US" dirty="0" smtClean="0"/>
+              <a:rPr lang="en-US" dirty="0"/>
               <a:t>Agenda</a:t>
             </a:r>
-            <a:endParaRPr lang="en-US" dirty="0"/>
           </a:p>
         </p:txBody>
       </p:sp>
@@ -25847,7 +25050,7 @@
               <a:buChar char="Ø"/>
             </a:pPr>
             <a:r>
-              <a:rPr lang="en-US" dirty="0" smtClean="0"/>
+              <a:rPr lang="en-US" dirty="0"/>
               <a:t>Introduction</a:t>
             </a:r>
           </a:p>
@@ -25867,7 +25070,7 @@
               <a:buChar char="Ø"/>
             </a:pPr>
             <a:r>
-              <a:rPr lang="en-US" dirty="0" smtClean="0">
+              <a:rPr lang="en-US" dirty="0">
                 <a:solidFill>
                   <a:srgbClr val="FF0000"/>
                 </a:solidFill>
@@ -25891,7 +25094,7 @@
               <a:buChar char="Ø"/>
             </a:pPr>
             <a:r>
-              <a:rPr lang="en-US" dirty="0" smtClean="0"/>
+              <a:rPr lang="en-US" dirty="0"/>
               <a:t>Strengths/Weaknesses</a:t>
             </a:r>
           </a:p>
@@ -25901,10 +25104,9 @@
               <a:buChar char="Ø"/>
             </a:pPr>
             <a:r>
-              <a:rPr lang="en-US" dirty="0" smtClean="0"/>
+              <a:rPr lang="en-US" dirty="0"/>
               <a:t>Future scope</a:t>
             </a:r>
-            <a:endParaRPr lang="en-US" dirty="0"/>
           </a:p>
         </p:txBody>
       </p:sp>
@@ -25918,13 +25120,6 @@
   <p:clrMapOvr>
     <a:masterClrMapping/>
   </p:clrMapOvr>
-  <p:timing>
-    <p:tnLst>
-      <p:par>
-        <p:cTn id="1" dur="indefinite" restart="never" nodeType="tmRoot"/>
-      </p:par>
-    </p:tnLst>
-  </p:timing>
 </p:sld>
 </file>
 

</xml_diff>